<commit_message>
made changes to powerpoint files;
</commit_message>
<xml_diff>
--- a/615final2.pptx
+++ b/615final2.pptx
@@ -1,25 +1,25 @@
 
 <file path=ppt/presentation.xml><?xml version="1.0" encoding="utf-8"?>
-<p:presentation xmlns:a="http://schemas.openxmlformats.org/drawingml/2006/main" xmlns:r="http://schemas.openxmlformats.org/officeDocument/2006/relationships" xmlns:p="http://schemas.openxmlformats.org/presentationml/2006/main" xmlns:m="http://schemas.openxmlformats.org/officeDocument/2006/math" xmlns:a14="http://schemas.microsoft.com/office/drawing/2010/main">
+<p:presentation xmlns:a="http://schemas.openxmlformats.org/drawingml/2006/main" xmlns:r="http://schemas.openxmlformats.org/officeDocument/2006/relationships" xmlns:p="http://schemas.openxmlformats.org/presentationml/2006/main">
   <p:sldMasterIdLst>
-    <p:sldMasterId id="2147483648" r:id="rId5"/>
+    <p:sldMasterId id="2147483648" r:id="rId1"/>
   </p:sldMasterIdLst>
   <p:notesMasterIdLst>
-    <p:notesMasterId r:id="rId7"/>
+    <p:notesMasterId r:id="rId12"/>
   </p:notesMasterIdLst>
   <p:sldIdLst>
-    <p:sldId id="256" r:id="rId8"/>
-    <p:sldId id="257" r:id="rId9"/>
-    <p:sldId id="258" r:id="rId10"/>
-    <p:sldId id="259" r:id="rId11"/>
-    <p:sldId id="260" r:id="rId12"/>
-    <p:sldId id="261" r:id="rId13"/>
-    <p:sldId id="262" r:id="rId14"/>
-    <p:sldId id="263" r:id="rId15"/>
-    <p:sldId id="264" r:id="rId16"/>
-    <p:sldId id="265" r:id="rId17"/>
+    <p:sldId id="256" r:id="rId2"/>
+    <p:sldId id="257" r:id="rId3"/>
+    <p:sldId id="258" r:id="rId4"/>
+    <p:sldId id="259" r:id="rId5"/>
+    <p:sldId id="260" r:id="rId6"/>
+    <p:sldId id="261" r:id="rId7"/>
+    <p:sldId id="262" r:id="rId8"/>
+    <p:sldId id="263" r:id="rId9"/>
+    <p:sldId id="264" r:id="rId10"/>
+    <p:sldId id="265" r:id="rId11"/>
   </p:sldIdLst>
-  <p:sldSz cx="9144000" cy="5143500"/>
+  <p:sldSz cx="9144000" cy="5143500" type="screen16x9"/>
   <p:notesSz cx="6858000" cy="9144000"/>
   <p:defaultTextStyle>
     <a:defPPr marL="0" marR="0" indent="0" algn="l" defTabSz="914400" rtl="0" fontAlgn="auto" latinLnBrk="1" hangingPunct="0">
@@ -37,7 +37,7 @@
       <a:buFontTx/>
       <a:buNone/>
       <a:tabLst/>
-      <a:defRPr b="0" baseline="0" cap="none" i="0" spc="0" strike="noStrike" sz="1800" u="none" kumimoji="0" normalizeH="0">
+      <a:defRPr kumimoji="0" sz="1800" b="0" i="0" u="none" strike="noStrike" cap="none" spc="0" normalizeH="0" baseline="0">
         <a:ln>
           <a:noFill/>
         </a:ln>
@@ -63,7 +63,7 @@
       <a:buFontTx/>
       <a:buNone/>
       <a:tabLst/>
-      <a:defRPr b="0" baseline="0" cap="none" i="0" spc="0" strike="noStrike" sz="1800" u="none" kumimoji="0" normalizeH="0">
+      <a:defRPr kumimoji="0" sz="1800" b="0" i="0" u="none" strike="noStrike" cap="none" spc="0" normalizeH="0" baseline="0">
         <a:ln>
           <a:noFill/>
         </a:ln>
@@ -93,7 +93,7 @@
       <a:buFontTx/>
       <a:buNone/>
       <a:tabLst/>
-      <a:defRPr b="0" baseline="0" cap="none" i="0" spc="0" strike="noStrike" sz="1800" u="none" kumimoji="0" normalizeH="0">
+      <a:defRPr kumimoji="0" sz="1800" b="0" i="0" u="none" strike="noStrike" cap="none" spc="0" normalizeH="0" baseline="0">
         <a:ln>
           <a:noFill/>
         </a:ln>
@@ -123,7 +123,7 @@
       <a:buFontTx/>
       <a:buNone/>
       <a:tabLst/>
-      <a:defRPr b="0" baseline="0" cap="none" i="0" spc="0" strike="noStrike" sz="1800" u="none" kumimoji="0" normalizeH="0">
+      <a:defRPr kumimoji="0" sz="1800" b="0" i="0" u="none" strike="noStrike" cap="none" spc="0" normalizeH="0" baseline="0">
         <a:ln>
           <a:noFill/>
         </a:ln>
@@ -153,7 +153,7 @@
       <a:buFontTx/>
       <a:buNone/>
       <a:tabLst/>
-      <a:defRPr b="0" baseline="0" cap="none" i="0" spc="0" strike="noStrike" sz="1800" u="none" kumimoji="0" normalizeH="0">
+      <a:defRPr kumimoji="0" sz="1800" b="0" i="0" u="none" strike="noStrike" cap="none" spc="0" normalizeH="0" baseline="0">
         <a:ln>
           <a:noFill/>
         </a:ln>
@@ -183,7 +183,7 @@
       <a:buFontTx/>
       <a:buNone/>
       <a:tabLst/>
-      <a:defRPr b="0" baseline="0" cap="none" i="0" spc="0" strike="noStrike" sz="1800" u="none" kumimoji="0" normalizeH="0">
+      <a:defRPr kumimoji="0" sz="1800" b="0" i="0" u="none" strike="noStrike" cap="none" spc="0" normalizeH="0" baseline="0">
         <a:ln>
           <a:noFill/>
         </a:ln>
@@ -213,7 +213,7 @@
       <a:buFontTx/>
       <a:buNone/>
       <a:tabLst/>
-      <a:defRPr b="0" baseline="0" cap="none" i="0" spc="0" strike="noStrike" sz="1800" u="none" kumimoji="0" normalizeH="0">
+      <a:defRPr kumimoji="0" sz="1800" b="0" i="0" u="none" strike="noStrike" cap="none" spc="0" normalizeH="0" baseline="0">
         <a:ln>
           <a:noFill/>
         </a:ln>
@@ -243,7 +243,7 @@
       <a:buFontTx/>
       <a:buNone/>
       <a:tabLst/>
-      <a:defRPr b="0" baseline="0" cap="none" i="0" spc="0" strike="noStrike" sz="1800" u="none" kumimoji="0" normalizeH="0">
+      <a:defRPr kumimoji="0" sz="1800" b="0" i="0" u="none" strike="noStrike" cap="none" spc="0" normalizeH="0" baseline="0">
         <a:ln>
           <a:noFill/>
         </a:ln>
@@ -273,7 +273,7 @@
       <a:buFontTx/>
       <a:buNone/>
       <a:tabLst/>
-      <a:defRPr b="0" baseline="0" cap="none" i="0" spc="0" strike="noStrike" sz="1800" u="none" kumimoji="0" normalizeH="0">
+      <a:defRPr kumimoji="0" sz="1800" b="0" i="0" u="none" strike="noStrike" cap="none" spc="0" normalizeH="0" baseline="0">
         <a:ln>
           <a:noFill/>
         </a:ln>
@@ -303,7 +303,7 @@
       <a:buFontTx/>
       <a:buNone/>
       <a:tabLst/>
-      <a:defRPr b="0" baseline="0" cap="none" i="0" spc="0" strike="noStrike" sz="1800" u="none" kumimoji="0" normalizeH="0">
+      <a:defRPr kumimoji="0" sz="1800" b="0" i="0" u="none" strike="noStrike" cap="none" spc="0" normalizeH="0" baseline="0">
         <a:ln>
           <a:noFill/>
         </a:ln>
@@ -322,13 +322,14 @@
 </p:presentation>
 </file>
 
-<file path=ppt/commentAuthors.xml><?xml version="1.0" encoding="utf-8"?>
-<p:cmAuthorLst xmlns:a="http://schemas.openxmlformats.org/drawingml/2006/main" xmlns:r="http://schemas.openxmlformats.org/officeDocument/2006/relationships" xmlns:p="http://schemas.openxmlformats.org/presentationml/2006/main" xmlns:m="http://schemas.openxmlformats.org/officeDocument/2006/math" xmlns:a14="http://schemas.microsoft.com/office/drawing/2010/main"/>
-</file>
-
 <file path=ppt/notesMasters/notesMaster1.xml><?xml version="1.0" encoding="utf-8"?>
-<p:notesMaster xmlns:a="http://schemas.openxmlformats.org/drawingml/2006/main" xmlns:r="http://schemas.openxmlformats.org/officeDocument/2006/relationships" xmlns:p="http://schemas.openxmlformats.org/presentationml/2006/main" xmlns:m="http://schemas.openxmlformats.org/officeDocument/2006/math" xmlns:a14="http://schemas.microsoft.com/office/drawing/2010/main">
+<p:notesMaster xmlns:a="http://schemas.openxmlformats.org/drawingml/2006/main" xmlns:r="http://schemas.openxmlformats.org/officeDocument/2006/relationships" xmlns:p="http://schemas.openxmlformats.org/presentationml/2006/main">
   <p:cSld>
+    <p:bg>
+      <p:bgRef idx="1001">
+        <a:schemeClr val="bg1"/>
+      </p:bgRef>
+    </p:bg>
     <p:spTree>
       <p:nvGrpSpPr>
         <p:cNvPr id="1" name=""/>
@@ -346,7 +347,9 @@
       <p:sp>
         <p:nvSpPr>
           <p:cNvPr id="91" name="Shape 91"/>
-          <p:cNvSpPr/>
+          <p:cNvSpPr>
+            <a:spLocks noGrp="1" noRot="1" noChangeAspect="1"/>
+          </p:cNvSpPr>
           <p:nvPr>
             <p:ph type="sldImg"/>
           </p:nvPr>
@@ -364,14 +367,16 @@
           <a:bodyPr/>
           <a:lstStyle/>
           <a:p>
-            <a:pPr/>
+            <a:endParaRPr/>
           </a:p>
         </p:txBody>
       </p:sp>
       <p:sp>
         <p:nvSpPr>
           <p:cNvPr id="92" name="Shape 92"/>
-          <p:cNvSpPr/>
+          <p:cNvSpPr>
+            <a:spLocks noGrp="1"/>
+          </p:cNvSpPr>
           <p:nvPr>
             <p:ph type="body" sz="quarter" idx="1"/>
           </p:nvPr>
@@ -389,7 +394,7 @@
           <a:bodyPr/>
           <a:lstStyle/>
           <a:p>
-            <a:pPr/>
+            <a:endParaRPr/>
           </a:p>
         </p:txBody>
       </p:sp>
@@ -474,7 +479,7 @@
 </file>
 
 <file path=ppt/slideLayouts/slideLayout1.xml><?xml version="1.0" encoding="utf-8"?>
-<p:sldLayout xmlns:a="http://schemas.openxmlformats.org/drawingml/2006/main" xmlns:r="http://schemas.openxmlformats.org/officeDocument/2006/relationships" xmlns:p="http://schemas.openxmlformats.org/presentationml/2006/main" xmlns:m="http://schemas.openxmlformats.org/officeDocument/2006/math" xmlns:a14="http://schemas.microsoft.com/office/drawing/2010/main" type="title" showMasterSp="1" showMasterPhAnim="1">
+<p:sldLayout xmlns:a="http://schemas.openxmlformats.org/drawingml/2006/main" xmlns:r="http://schemas.openxmlformats.org/officeDocument/2006/relationships" xmlns:p="http://schemas.openxmlformats.org/presentationml/2006/main" type="title">
   <p:cSld name="Title Slide">
     <p:spTree>
       <p:nvGrpSpPr>
@@ -493,7 +498,9 @@
       <p:sp>
         <p:nvSpPr>
           <p:cNvPr id="11" name="Title Text"/>
-          <p:cNvSpPr txBox="1"/>
+          <p:cNvSpPr txBox="1">
+            <a:spLocks noGrp="1"/>
+          </p:cNvSpPr>
           <p:nvPr>
             <p:ph type="title"/>
           </p:nvPr>
@@ -511,7 +518,6 @@
           <a:bodyPr/>
           <a:lstStyle/>
           <a:p>
-            <a:pPr/>
             <a:r>
               <a:t>Title Text</a:t>
             </a:r>
@@ -521,7 +527,9 @@
       <p:sp>
         <p:nvSpPr>
           <p:cNvPr id="12" name="Body Level One…"/>
-          <p:cNvSpPr txBox="1"/>
+          <p:cNvSpPr txBox="1">
+            <a:spLocks noGrp="1"/>
+          </p:cNvSpPr>
           <p:nvPr>
             <p:ph type="body" sz="quarter" idx="1"/>
           </p:nvPr>
@@ -580,7 +588,6 @@
             </a:lvl5pPr>
           </a:lstStyle>
           <a:p>
-            <a:pPr/>
             <a:r>
               <a:t>Body Level One</a:t>
             </a:r>
@@ -614,7 +621,9 @@
       <p:sp>
         <p:nvSpPr>
           <p:cNvPr id="13" name="Slide Number"/>
-          <p:cNvSpPr txBox="1"/>
+          <p:cNvSpPr txBox="1">
+            <a:spLocks noGrp="1"/>
+          </p:cNvSpPr>
           <p:nvPr>
             <p:ph type="sldNum" sz="quarter" idx="2"/>
           </p:nvPr>
@@ -628,8 +637,10 @@
           <a:bodyPr/>
           <a:lstStyle/>
           <a:p>
-            <a:pPr/>
-            <a:fld id="{86CB4B4D-7CA3-9044-876B-883B54F8677D}" type="slidenum"/>
+            <a:fld id="{86CB4B4D-7CA3-9044-876B-883B54F8677D}" type="slidenum">
+              <a:t>‹#›</a:t>
+            </a:fld>
+            <a:endParaRPr/>
           </a:p>
         </p:txBody>
       </p:sp>
@@ -638,12 +649,12 @@
   <p:clrMapOvr>
     <a:masterClrMapping/>
   </p:clrMapOvr>
-  <p:transition xmlns:p14="http://schemas.microsoft.com/office/powerpoint/2010/main" spd="med" advClick="1"/>
+  <p:transition spd="med"/>
 </p:sldLayout>
 </file>
 
 <file path=ppt/slideLayouts/slideLayout2.xml><?xml version="1.0" encoding="utf-8"?>
-<p:sldLayout xmlns:a="http://schemas.openxmlformats.org/drawingml/2006/main" xmlns:r="http://schemas.openxmlformats.org/officeDocument/2006/relationships" xmlns:p="http://schemas.openxmlformats.org/presentationml/2006/main" xmlns:m="http://schemas.openxmlformats.org/officeDocument/2006/math" xmlns:a14="http://schemas.microsoft.com/office/drawing/2010/main" type="tx" showMasterSp="1" showMasterPhAnim="1">
+<p:sldLayout xmlns:a="http://schemas.openxmlformats.org/drawingml/2006/main" xmlns:r="http://schemas.openxmlformats.org/officeDocument/2006/relationships" xmlns:p="http://schemas.openxmlformats.org/presentationml/2006/main" type="tx">
   <p:cSld name="Title and Content">
     <p:spTree>
       <p:nvGrpSpPr>
@@ -662,7 +673,9 @@
       <p:sp>
         <p:nvSpPr>
           <p:cNvPr id="20" name="Title Text"/>
-          <p:cNvSpPr txBox="1"/>
+          <p:cNvSpPr txBox="1">
+            <a:spLocks noGrp="1"/>
+          </p:cNvSpPr>
           <p:nvPr>
             <p:ph type="title"/>
           </p:nvPr>
@@ -676,7 +689,6 @@
           <a:bodyPr/>
           <a:lstStyle/>
           <a:p>
-            <a:pPr/>
             <a:r>
               <a:t>Title Text</a:t>
             </a:r>
@@ -686,7 +698,9 @@
       <p:sp>
         <p:nvSpPr>
           <p:cNvPr id="21" name="Body Level One…"/>
-          <p:cNvSpPr txBox="1"/>
+          <p:cNvSpPr txBox="1">
+            <a:spLocks noGrp="1"/>
+          </p:cNvSpPr>
           <p:nvPr>
             <p:ph type="body" idx="1"/>
           </p:nvPr>
@@ -700,7 +714,6 @@
           <a:bodyPr/>
           <a:lstStyle/>
           <a:p>
-            <a:pPr/>
             <a:r>
               <a:t>Body Level One</a:t>
             </a:r>
@@ -734,7 +747,9 @@
       <p:sp>
         <p:nvSpPr>
           <p:cNvPr id="22" name="Slide Number"/>
-          <p:cNvSpPr txBox="1"/>
+          <p:cNvSpPr txBox="1">
+            <a:spLocks noGrp="1"/>
+          </p:cNvSpPr>
           <p:nvPr>
             <p:ph type="sldNum" sz="quarter" idx="2"/>
           </p:nvPr>
@@ -748,8 +763,10 @@
           <a:bodyPr/>
           <a:lstStyle/>
           <a:p>
-            <a:pPr/>
-            <a:fld id="{86CB4B4D-7CA3-9044-876B-883B54F8677D}" type="slidenum"/>
+            <a:fld id="{86CB4B4D-7CA3-9044-876B-883B54F8677D}" type="slidenum">
+              <a:t>‹#›</a:t>
+            </a:fld>
+            <a:endParaRPr/>
           </a:p>
         </p:txBody>
       </p:sp>
@@ -758,12 +775,12 @@
   <p:clrMapOvr>
     <a:masterClrMapping/>
   </p:clrMapOvr>
-  <p:transition xmlns:p14="http://schemas.microsoft.com/office/powerpoint/2010/main" spd="med" advClick="1"/>
+  <p:transition spd="med"/>
 </p:sldLayout>
 </file>
 
 <file path=ppt/slideLayouts/slideLayout3.xml><?xml version="1.0" encoding="utf-8"?>
-<p:sldLayout xmlns:a="http://schemas.openxmlformats.org/drawingml/2006/main" xmlns:r="http://schemas.openxmlformats.org/officeDocument/2006/relationships" xmlns:p="http://schemas.openxmlformats.org/presentationml/2006/main" xmlns:m="http://schemas.openxmlformats.org/officeDocument/2006/math" xmlns:a14="http://schemas.microsoft.com/office/drawing/2010/main" type="tx" showMasterSp="1" showMasterPhAnim="1">
+<p:sldLayout xmlns:a="http://schemas.openxmlformats.org/drawingml/2006/main" xmlns:r="http://schemas.openxmlformats.org/officeDocument/2006/relationships" xmlns:p="http://schemas.openxmlformats.org/presentationml/2006/main" type="tx">
   <p:cSld name="Section Header">
     <p:spTree>
       <p:nvGrpSpPr>
@@ -782,7 +799,9 @@
       <p:sp>
         <p:nvSpPr>
           <p:cNvPr id="29" name="Title Text"/>
-          <p:cNvSpPr txBox="1"/>
+          <p:cNvSpPr txBox="1">
+            <a:spLocks noGrp="1"/>
+          </p:cNvSpPr>
           <p:nvPr>
             <p:ph type="title"/>
           </p:nvPr>
@@ -800,11 +819,10 @@
           <a:bodyPr anchor="t"/>
           <a:lstStyle>
             <a:lvl1pPr>
-              <a:defRPr b="1" cap="all" sz="3000"/>
+              <a:defRPr sz="3000" b="1" cap="all"/>
             </a:lvl1pPr>
           </a:lstStyle>
           <a:p>
-            <a:pPr/>
             <a:r>
               <a:t>Title Text</a:t>
             </a:r>
@@ -814,7 +832,9 @@
       <p:sp>
         <p:nvSpPr>
           <p:cNvPr id="30" name="Body Level One…"/>
-          <p:cNvSpPr txBox="1"/>
+          <p:cNvSpPr txBox="1">
+            <a:spLocks noGrp="1"/>
+          </p:cNvSpPr>
           <p:nvPr>
             <p:ph type="body" sz="quarter" idx="1"/>
           </p:nvPr>
@@ -888,7 +908,6 @@
             </a:lvl5pPr>
           </a:lstStyle>
           <a:p>
-            <a:pPr/>
             <a:r>
               <a:t>Body Level One</a:t>
             </a:r>
@@ -922,7 +941,9 @@
       <p:sp>
         <p:nvSpPr>
           <p:cNvPr id="31" name="Slide Number"/>
-          <p:cNvSpPr txBox="1"/>
+          <p:cNvSpPr txBox="1">
+            <a:spLocks noGrp="1"/>
+          </p:cNvSpPr>
           <p:nvPr>
             <p:ph type="sldNum" sz="quarter" idx="2"/>
           </p:nvPr>
@@ -936,8 +957,10 @@
           <a:bodyPr/>
           <a:lstStyle/>
           <a:p>
-            <a:pPr/>
-            <a:fld id="{86CB4B4D-7CA3-9044-876B-883B54F8677D}" type="slidenum"/>
+            <a:fld id="{86CB4B4D-7CA3-9044-876B-883B54F8677D}" type="slidenum">
+              <a:t>‹#›</a:t>
+            </a:fld>
+            <a:endParaRPr/>
           </a:p>
         </p:txBody>
       </p:sp>
@@ -946,12 +969,12 @@
   <p:clrMapOvr>
     <a:masterClrMapping/>
   </p:clrMapOvr>
-  <p:transition xmlns:p14="http://schemas.microsoft.com/office/powerpoint/2010/main" spd="med" advClick="1"/>
+  <p:transition spd="med"/>
 </p:sldLayout>
 </file>
 
 <file path=ppt/slideLayouts/slideLayout4.xml><?xml version="1.0" encoding="utf-8"?>
-<p:sldLayout xmlns:a="http://schemas.openxmlformats.org/drawingml/2006/main" xmlns:r="http://schemas.openxmlformats.org/officeDocument/2006/relationships" xmlns:p="http://schemas.openxmlformats.org/presentationml/2006/main" xmlns:m="http://schemas.openxmlformats.org/officeDocument/2006/math" xmlns:a14="http://schemas.microsoft.com/office/drawing/2010/main" type="tx" showMasterSp="1" showMasterPhAnim="1">
+<p:sldLayout xmlns:a="http://schemas.openxmlformats.org/drawingml/2006/main" xmlns:r="http://schemas.openxmlformats.org/officeDocument/2006/relationships" xmlns:p="http://schemas.openxmlformats.org/presentationml/2006/main" type="tx">
   <p:cSld name="Two Content">
     <p:spTree>
       <p:nvGrpSpPr>
@@ -970,7 +993,9 @@
       <p:sp>
         <p:nvSpPr>
           <p:cNvPr id="38" name="Title Text"/>
-          <p:cNvSpPr txBox="1"/>
+          <p:cNvSpPr txBox="1">
+            <a:spLocks noGrp="1"/>
+          </p:cNvSpPr>
           <p:nvPr>
             <p:ph type="title"/>
           </p:nvPr>
@@ -984,7 +1009,6 @@
           <a:bodyPr/>
           <a:lstStyle/>
           <a:p>
-            <a:pPr/>
             <a:r>
               <a:t>Title Text</a:t>
             </a:r>
@@ -994,7 +1018,9 @@
       <p:sp>
         <p:nvSpPr>
           <p:cNvPr id="39" name="Body Level One…"/>
-          <p:cNvSpPr txBox="1"/>
+          <p:cNvSpPr txBox="1">
+            <a:spLocks noGrp="1"/>
+          </p:cNvSpPr>
           <p:nvPr>
             <p:ph type="body" sz="half" idx="1"/>
           </p:nvPr>
@@ -1028,7 +1054,6 @@
             </a:lvl5pPr>
           </a:lstStyle>
           <a:p>
-            <a:pPr/>
             <a:r>
               <a:t>Body Level One</a:t>
             </a:r>
@@ -1062,7 +1087,9 @@
       <p:sp>
         <p:nvSpPr>
           <p:cNvPr id="40" name="Slide Number"/>
-          <p:cNvSpPr txBox="1"/>
+          <p:cNvSpPr txBox="1">
+            <a:spLocks noGrp="1"/>
+          </p:cNvSpPr>
           <p:nvPr>
             <p:ph type="sldNum" sz="quarter" idx="2"/>
           </p:nvPr>
@@ -1076,8 +1103,10 @@
           <a:bodyPr/>
           <a:lstStyle/>
           <a:p>
-            <a:pPr/>
-            <a:fld id="{86CB4B4D-7CA3-9044-876B-883B54F8677D}" type="slidenum"/>
+            <a:fld id="{86CB4B4D-7CA3-9044-876B-883B54F8677D}" type="slidenum">
+              <a:t>‹#›</a:t>
+            </a:fld>
+            <a:endParaRPr/>
           </a:p>
         </p:txBody>
       </p:sp>
@@ -1086,12 +1115,12 @@
   <p:clrMapOvr>
     <a:masterClrMapping/>
   </p:clrMapOvr>
-  <p:transition xmlns:p14="http://schemas.microsoft.com/office/powerpoint/2010/main" spd="med" advClick="1"/>
+  <p:transition spd="med"/>
 </p:sldLayout>
 </file>
 
 <file path=ppt/slideLayouts/slideLayout5.xml><?xml version="1.0" encoding="utf-8"?>
-<p:sldLayout xmlns:a="http://schemas.openxmlformats.org/drawingml/2006/main" xmlns:r="http://schemas.openxmlformats.org/officeDocument/2006/relationships" xmlns:p="http://schemas.openxmlformats.org/presentationml/2006/main" xmlns:m="http://schemas.openxmlformats.org/officeDocument/2006/math" xmlns:a14="http://schemas.microsoft.com/office/drawing/2010/main" type="tx" showMasterSp="1" showMasterPhAnim="1">
+<p:sldLayout xmlns:a="http://schemas.openxmlformats.org/drawingml/2006/main" xmlns:r="http://schemas.openxmlformats.org/officeDocument/2006/relationships" xmlns:p="http://schemas.openxmlformats.org/presentationml/2006/main" type="tx">
   <p:cSld name="Comparison">
     <p:spTree>
       <p:nvGrpSpPr>
@@ -1110,7 +1139,9 @@
       <p:sp>
         <p:nvSpPr>
           <p:cNvPr id="47" name="Title Text"/>
-          <p:cNvSpPr txBox="1"/>
+          <p:cNvSpPr txBox="1">
+            <a:spLocks noGrp="1"/>
+          </p:cNvSpPr>
           <p:nvPr>
             <p:ph type="title"/>
           </p:nvPr>
@@ -1124,7 +1155,6 @@
           <a:bodyPr/>
           <a:lstStyle/>
           <a:p>
-            <a:pPr/>
             <a:r>
               <a:t>Title Text</a:t>
             </a:r>
@@ -1134,7 +1164,9 @@
       <p:sp>
         <p:nvSpPr>
           <p:cNvPr id="48" name="Body Level One…"/>
-          <p:cNvSpPr txBox="1"/>
+          <p:cNvSpPr txBox="1">
+            <a:spLocks noGrp="1"/>
+          </p:cNvSpPr>
           <p:nvPr>
             <p:ph type="body" sz="quarter" idx="1"/>
           </p:nvPr>
@@ -1156,39 +1188,38 @@
                 <a:spcPts val="400"/>
               </a:spcBef>
               <a:buFontTx/>
-              <a:defRPr b="1" sz="1800"/>
+              <a:defRPr sz="1800" b="1"/>
             </a:lvl1pPr>
             <a:lvl2pPr>
               <a:spcBef>
                 <a:spcPts val="400"/>
               </a:spcBef>
               <a:buFontTx/>
-              <a:defRPr b="1" sz="1800"/>
+              <a:defRPr sz="1800" b="1"/>
             </a:lvl2pPr>
             <a:lvl3pPr>
               <a:spcBef>
                 <a:spcPts val="400"/>
               </a:spcBef>
               <a:buFontTx/>
-              <a:defRPr b="1" sz="1800"/>
+              <a:defRPr sz="1800" b="1"/>
             </a:lvl3pPr>
             <a:lvl4pPr>
               <a:spcBef>
                 <a:spcPts val="400"/>
               </a:spcBef>
               <a:buFontTx/>
-              <a:defRPr b="1" sz="1800"/>
+              <a:defRPr sz="1800" b="1"/>
             </a:lvl4pPr>
             <a:lvl5pPr>
               <a:spcBef>
                 <a:spcPts val="400"/>
               </a:spcBef>
               <a:buFontTx/>
-              <a:defRPr b="1" sz="1800"/>
+              <a:defRPr sz="1800" b="1"/>
             </a:lvl5pPr>
           </a:lstStyle>
           <a:p>
-            <a:pPr/>
             <a:r>
               <a:t>Body Level One</a:t>
             </a:r>
@@ -1222,7 +1253,9 @@
       <p:sp>
         <p:nvSpPr>
           <p:cNvPr id="49" name="Text Placeholder 4"/>
-          <p:cNvSpPr/>
+          <p:cNvSpPr>
+            <a:spLocks noGrp="1"/>
+          </p:cNvSpPr>
           <p:nvPr>
             <p:ph type="body" sz="quarter" idx="21"/>
           </p:nvPr>
@@ -1245,15 +1278,18 @@
                 <a:spcPts val="400"/>
               </a:spcBef>
               <a:buFontTx/>
-              <a:defRPr b="1" sz="1800"/>
+              <a:defRPr sz="1800" b="1"/>
             </a:pPr>
+            <a:endParaRPr/>
           </a:p>
         </p:txBody>
       </p:sp>
       <p:sp>
         <p:nvSpPr>
           <p:cNvPr id="50" name="Slide Number"/>
-          <p:cNvSpPr txBox="1"/>
+          <p:cNvSpPr txBox="1">
+            <a:spLocks noGrp="1"/>
+          </p:cNvSpPr>
           <p:nvPr>
             <p:ph type="sldNum" sz="quarter" idx="2"/>
           </p:nvPr>
@@ -1267,8 +1303,10 @@
           <a:bodyPr/>
           <a:lstStyle/>
           <a:p>
-            <a:pPr/>
-            <a:fld id="{86CB4B4D-7CA3-9044-876B-883B54F8677D}" type="slidenum"/>
+            <a:fld id="{86CB4B4D-7CA3-9044-876B-883B54F8677D}" type="slidenum">
+              <a:t>‹#›</a:t>
+            </a:fld>
+            <a:endParaRPr/>
           </a:p>
         </p:txBody>
       </p:sp>
@@ -1277,12 +1315,12 @@
   <p:clrMapOvr>
     <a:masterClrMapping/>
   </p:clrMapOvr>
-  <p:transition xmlns:p14="http://schemas.microsoft.com/office/powerpoint/2010/main" spd="med" advClick="1"/>
+  <p:transition spd="med"/>
 </p:sldLayout>
 </file>
 
 <file path=ppt/slideLayouts/slideLayout6.xml><?xml version="1.0" encoding="utf-8"?>
-<p:sldLayout xmlns:a="http://schemas.openxmlformats.org/drawingml/2006/main" xmlns:r="http://schemas.openxmlformats.org/officeDocument/2006/relationships" xmlns:p="http://schemas.openxmlformats.org/presentationml/2006/main" xmlns:m="http://schemas.openxmlformats.org/officeDocument/2006/math" xmlns:a14="http://schemas.microsoft.com/office/drawing/2010/main" type="tx" showMasterSp="1" showMasterPhAnim="1">
+<p:sldLayout xmlns:a="http://schemas.openxmlformats.org/drawingml/2006/main" xmlns:r="http://schemas.openxmlformats.org/officeDocument/2006/relationships" xmlns:p="http://schemas.openxmlformats.org/presentationml/2006/main" type="tx">
   <p:cSld name="Title Only">
     <p:spTree>
       <p:nvGrpSpPr>
@@ -1301,7 +1339,9 @@
       <p:sp>
         <p:nvSpPr>
           <p:cNvPr id="57" name="Title Text"/>
-          <p:cNvSpPr txBox="1"/>
+          <p:cNvSpPr txBox="1">
+            <a:spLocks noGrp="1"/>
+          </p:cNvSpPr>
           <p:nvPr>
             <p:ph type="title"/>
           </p:nvPr>
@@ -1315,7 +1355,6 @@
           <a:bodyPr/>
           <a:lstStyle/>
           <a:p>
-            <a:pPr/>
             <a:r>
               <a:t>Title Text</a:t>
             </a:r>
@@ -1325,7 +1364,9 @@
       <p:sp>
         <p:nvSpPr>
           <p:cNvPr id="58" name="Slide Number"/>
-          <p:cNvSpPr txBox="1"/>
+          <p:cNvSpPr txBox="1">
+            <a:spLocks noGrp="1"/>
+          </p:cNvSpPr>
           <p:nvPr>
             <p:ph type="sldNum" sz="quarter" idx="2"/>
           </p:nvPr>
@@ -1339,8 +1380,10 @@
           <a:bodyPr/>
           <a:lstStyle/>
           <a:p>
-            <a:pPr/>
-            <a:fld id="{86CB4B4D-7CA3-9044-876B-883B54F8677D}" type="slidenum"/>
+            <a:fld id="{86CB4B4D-7CA3-9044-876B-883B54F8677D}" type="slidenum">
+              <a:t>‹#›</a:t>
+            </a:fld>
+            <a:endParaRPr/>
           </a:p>
         </p:txBody>
       </p:sp>
@@ -1349,12 +1392,12 @@
   <p:clrMapOvr>
     <a:masterClrMapping/>
   </p:clrMapOvr>
-  <p:transition xmlns:p14="http://schemas.microsoft.com/office/powerpoint/2010/main" spd="med" advClick="1"/>
+  <p:transition spd="med"/>
 </p:sldLayout>
 </file>
 
 <file path=ppt/slideLayouts/slideLayout7.xml><?xml version="1.0" encoding="utf-8"?>
-<p:sldLayout xmlns:a="http://schemas.openxmlformats.org/drawingml/2006/main" xmlns:r="http://schemas.openxmlformats.org/officeDocument/2006/relationships" xmlns:p="http://schemas.openxmlformats.org/presentationml/2006/main" xmlns:m="http://schemas.openxmlformats.org/officeDocument/2006/math" xmlns:a14="http://schemas.microsoft.com/office/drawing/2010/main" type="tx" showMasterSp="1" showMasterPhAnim="1">
+<p:sldLayout xmlns:a="http://schemas.openxmlformats.org/drawingml/2006/main" xmlns:r="http://schemas.openxmlformats.org/officeDocument/2006/relationships" xmlns:p="http://schemas.openxmlformats.org/presentationml/2006/main" type="tx">
   <p:cSld name="Blank">
     <p:spTree>
       <p:nvGrpSpPr>
@@ -1373,7 +1416,9 @@
       <p:sp>
         <p:nvSpPr>
           <p:cNvPr id="65" name="Slide Number"/>
-          <p:cNvSpPr txBox="1"/>
+          <p:cNvSpPr txBox="1">
+            <a:spLocks noGrp="1"/>
+          </p:cNvSpPr>
           <p:nvPr>
             <p:ph type="sldNum" sz="quarter" idx="2"/>
           </p:nvPr>
@@ -1387,8 +1432,10 @@
           <a:bodyPr/>
           <a:lstStyle/>
           <a:p>
-            <a:pPr/>
-            <a:fld id="{86CB4B4D-7CA3-9044-876B-883B54F8677D}" type="slidenum"/>
+            <a:fld id="{86CB4B4D-7CA3-9044-876B-883B54F8677D}" type="slidenum">
+              <a:t>‹#›</a:t>
+            </a:fld>
+            <a:endParaRPr/>
           </a:p>
         </p:txBody>
       </p:sp>
@@ -1397,12 +1444,12 @@
   <p:clrMapOvr>
     <a:masterClrMapping/>
   </p:clrMapOvr>
-  <p:transition xmlns:p14="http://schemas.microsoft.com/office/powerpoint/2010/main" spd="med" advClick="1"/>
+  <p:transition spd="med"/>
 </p:sldLayout>
 </file>
 
 <file path=ppt/slideLayouts/slideLayout8.xml><?xml version="1.0" encoding="utf-8"?>
-<p:sldLayout xmlns:a="http://schemas.openxmlformats.org/drawingml/2006/main" xmlns:r="http://schemas.openxmlformats.org/officeDocument/2006/relationships" xmlns:p="http://schemas.openxmlformats.org/presentationml/2006/main" xmlns:m="http://schemas.openxmlformats.org/officeDocument/2006/math" xmlns:a14="http://schemas.microsoft.com/office/drawing/2010/main" type="tx" showMasterSp="1" showMasterPhAnim="1">
+<p:sldLayout xmlns:a="http://schemas.openxmlformats.org/drawingml/2006/main" xmlns:r="http://schemas.openxmlformats.org/officeDocument/2006/relationships" xmlns:p="http://schemas.openxmlformats.org/presentationml/2006/main" type="tx">
   <p:cSld name="Content with Caption">
     <p:spTree>
       <p:nvGrpSpPr>
@@ -1421,7 +1468,9 @@
       <p:sp>
         <p:nvSpPr>
           <p:cNvPr id="72" name="Title Text"/>
-          <p:cNvSpPr txBox="1"/>
+          <p:cNvSpPr txBox="1">
+            <a:spLocks noGrp="1"/>
+          </p:cNvSpPr>
           <p:nvPr>
             <p:ph type="title"/>
           </p:nvPr>
@@ -1439,11 +1488,10 @@
           <a:bodyPr anchor="b"/>
           <a:lstStyle>
             <a:lvl1pPr>
-              <a:defRPr b="1" sz="1500"/>
+              <a:defRPr sz="1500" b="1"/>
             </a:lvl1pPr>
           </a:lstStyle>
           <a:p>
-            <a:pPr/>
             <a:r>
               <a:t>Title Text</a:t>
             </a:r>
@@ -1453,7 +1501,9 @@
       <p:sp>
         <p:nvSpPr>
           <p:cNvPr id="73" name="Body Level One…"/>
-          <p:cNvSpPr txBox="1"/>
+          <p:cNvSpPr txBox="1">
+            <a:spLocks noGrp="1"/>
+          </p:cNvSpPr>
           <p:nvPr>
             <p:ph type="body" idx="1"/>
           </p:nvPr>
@@ -1471,7 +1521,6 @@
           <a:bodyPr/>
           <a:lstStyle/>
           <a:p>
-            <a:pPr/>
             <a:r>
               <a:t>Body Level One</a:t>
             </a:r>
@@ -1505,7 +1554,9 @@
       <p:sp>
         <p:nvSpPr>
           <p:cNvPr id="74" name="Text Placeholder 3"/>
-          <p:cNvSpPr/>
+          <p:cNvSpPr>
+            <a:spLocks noGrp="1"/>
+          </p:cNvSpPr>
           <p:nvPr>
             <p:ph type="body" sz="half" idx="21"/>
           </p:nvPr>
@@ -1530,13 +1581,16 @@
               <a:buFontTx/>
               <a:defRPr sz="1000"/>
             </a:pPr>
+            <a:endParaRPr/>
           </a:p>
         </p:txBody>
       </p:sp>
       <p:sp>
         <p:nvSpPr>
           <p:cNvPr id="75" name="Slide Number"/>
-          <p:cNvSpPr txBox="1"/>
+          <p:cNvSpPr txBox="1">
+            <a:spLocks noGrp="1"/>
+          </p:cNvSpPr>
           <p:nvPr>
             <p:ph type="sldNum" sz="quarter" idx="2"/>
           </p:nvPr>
@@ -1550,8 +1604,10 @@
           <a:bodyPr/>
           <a:lstStyle/>
           <a:p>
-            <a:pPr/>
-            <a:fld id="{86CB4B4D-7CA3-9044-876B-883B54F8677D}" type="slidenum"/>
+            <a:fld id="{86CB4B4D-7CA3-9044-876B-883B54F8677D}" type="slidenum">
+              <a:t>‹#›</a:t>
+            </a:fld>
+            <a:endParaRPr/>
           </a:p>
         </p:txBody>
       </p:sp>
@@ -1560,12 +1616,12 @@
   <p:clrMapOvr>
     <a:masterClrMapping/>
   </p:clrMapOvr>
-  <p:transition xmlns:p14="http://schemas.microsoft.com/office/powerpoint/2010/main" spd="med" advClick="1"/>
+  <p:transition spd="med"/>
 </p:sldLayout>
 </file>
 
 <file path=ppt/slideLayouts/slideLayout9.xml><?xml version="1.0" encoding="utf-8"?>
-<p:sldLayout xmlns:a="http://schemas.openxmlformats.org/drawingml/2006/main" xmlns:r="http://schemas.openxmlformats.org/officeDocument/2006/relationships" xmlns:p="http://schemas.openxmlformats.org/presentationml/2006/main" xmlns:m="http://schemas.openxmlformats.org/officeDocument/2006/math" xmlns:a14="http://schemas.microsoft.com/office/drawing/2010/main" type="tx" showMasterSp="1" showMasterPhAnim="1">
+<p:sldLayout xmlns:a="http://schemas.openxmlformats.org/drawingml/2006/main" xmlns:r="http://schemas.openxmlformats.org/officeDocument/2006/relationships" xmlns:p="http://schemas.openxmlformats.org/presentationml/2006/main" type="tx">
   <p:cSld name="Picture with Caption">
     <p:spTree>
       <p:nvGrpSpPr>
@@ -1584,7 +1640,9 @@
       <p:sp>
         <p:nvSpPr>
           <p:cNvPr id="82" name="Title Text"/>
-          <p:cNvSpPr txBox="1"/>
+          <p:cNvSpPr txBox="1">
+            <a:spLocks noGrp="1"/>
+          </p:cNvSpPr>
           <p:nvPr>
             <p:ph type="title"/>
           </p:nvPr>
@@ -1602,11 +1660,10 @@
           <a:bodyPr anchor="b"/>
           <a:lstStyle>
             <a:lvl1pPr>
-              <a:defRPr b="1" sz="1500"/>
+              <a:defRPr sz="1500" b="1"/>
             </a:lvl1pPr>
           </a:lstStyle>
           <a:p>
-            <a:pPr/>
             <a:r>
               <a:t>Title Text</a:t>
             </a:r>
@@ -1616,7 +1673,9 @@
       <p:sp>
         <p:nvSpPr>
           <p:cNvPr id="83" name="Picture Placeholder 2"/>
-          <p:cNvSpPr/>
+          <p:cNvSpPr>
+            <a:spLocks noGrp="1"/>
+          </p:cNvSpPr>
           <p:nvPr>
             <p:ph type="pic" sz="half" idx="21"/>
           </p:nvPr>
@@ -1636,14 +1695,16 @@
           </a:bodyPr>
           <a:lstStyle/>
           <a:p>
-            <a:pPr/>
+            <a:endParaRPr/>
           </a:p>
         </p:txBody>
       </p:sp>
       <p:sp>
         <p:nvSpPr>
           <p:cNvPr id="84" name="Body Level One…"/>
-          <p:cNvSpPr txBox="1"/>
+          <p:cNvSpPr txBox="1">
+            <a:spLocks noGrp="1"/>
+          </p:cNvSpPr>
           <p:nvPr>
             <p:ph type="body" sz="quarter" idx="1"/>
           </p:nvPr>
@@ -1697,7 +1758,6 @@
             </a:lvl5pPr>
           </a:lstStyle>
           <a:p>
-            <a:pPr/>
             <a:r>
               <a:t>Body Level One</a:t>
             </a:r>
@@ -1731,7 +1791,9 @@
       <p:sp>
         <p:nvSpPr>
           <p:cNvPr id="85" name="Slide Number"/>
-          <p:cNvSpPr txBox="1"/>
+          <p:cNvSpPr txBox="1">
+            <a:spLocks noGrp="1"/>
+          </p:cNvSpPr>
           <p:nvPr>
             <p:ph type="sldNum" sz="quarter" idx="2"/>
           </p:nvPr>
@@ -1745,8 +1807,10 @@
           <a:bodyPr/>
           <a:lstStyle/>
           <a:p>
-            <a:pPr/>
-            <a:fld id="{86CB4B4D-7CA3-9044-876B-883B54F8677D}" type="slidenum"/>
+            <a:fld id="{86CB4B4D-7CA3-9044-876B-883B54F8677D}" type="slidenum">
+              <a:t>‹#›</a:t>
+            </a:fld>
+            <a:endParaRPr/>
           </a:p>
         </p:txBody>
       </p:sp>
@@ -1755,18 +1819,19 @@
   <p:clrMapOvr>
     <a:masterClrMapping/>
   </p:clrMapOvr>
-  <p:transition xmlns:p14="http://schemas.microsoft.com/office/powerpoint/2010/main" spd="med" advClick="1"/>
+  <p:transition spd="med"/>
 </p:sldLayout>
 </file>
 
 <file path=ppt/slideMasters/slideMaster1.xml><?xml version="1.0" encoding="utf-8"?>
-<p:sldMaster xmlns:a="http://schemas.openxmlformats.org/drawingml/2006/main" xmlns:r="http://schemas.openxmlformats.org/officeDocument/2006/relationships" xmlns:p="http://schemas.openxmlformats.org/presentationml/2006/main" xmlns:m="http://schemas.openxmlformats.org/officeDocument/2006/math" xmlns:a14="http://schemas.microsoft.com/office/drawing/2010/main">
+<p:sldMaster xmlns:a="http://schemas.openxmlformats.org/drawingml/2006/main" xmlns:r="http://schemas.openxmlformats.org/officeDocument/2006/relationships" xmlns:p="http://schemas.openxmlformats.org/presentationml/2006/main">
   <p:cSld>
     <p:bg>
       <p:bgPr>
         <a:solidFill>
           <a:srgbClr val="FFFFFF"/>
         </a:solidFill>
+        <a:effectLst/>
       </p:bgPr>
     </p:bg>
     <p:spTree>
@@ -1786,7 +1851,9 @@
       <p:sp>
         <p:nvSpPr>
           <p:cNvPr id="2" name="Title Text"/>
-          <p:cNvSpPr txBox="1"/>
+          <p:cNvSpPr txBox="1">
+            <a:spLocks noGrp="1"/>
+          </p:cNvSpPr>
           <p:nvPr>
             <p:ph type="title"/>
           </p:nvPr>
@@ -1804,17 +1871,16 @@
           </a:ln>
           <a:extLst>
             <a:ext uri="{C572A759-6A51-4108-AA02-DFA0A04FC94B}">
-              <ma14:wrappingTextBoxFlag xmlns:ma14="http://schemas.microsoft.com/office/mac/drawingml/2011/main" val="1"/>
+              <ma14:wrappingTextBoxFlag xmlns:ma14="http://schemas.microsoft.com/office/mac/drawingml/2011/main" xmlns:a14="http://schemas.microsoft.com/office/drawing/2010/main" xmlns:m="http://schemas.openxmlformats.org/officeDocument/2006/math" xmlns="" val="1"/>
             </a:ext>
           </a:extLst>
         </p:spPr>
         <p:txBody>
           <a:bodyPr lIns="45719" rIns="45719" anchor="ctr">
-            <a:normAutofit fontScale="100000" lnSpcReduction="0"/>
+            <a:normAutofit/>
           </a:bodyPr>
           <a:lstStyle/>
           <a:p>
-            <a:pPr/>
             <a:r>
               <a:t>Title Text</a:t>
             </a:r>
@@ -1824,7 +1890,9 @@
       <p:sp>
         <p:nvSpPr>
           <p:cNvPr id="3" name="Body Level One…"/>
-          <p:cNvSpPr txBox="1"/>
+          <p:cNvSpPr txBox="1">
+            <a:spLocks noGrp="1"/>
+          </p:cNvSpPr>
           <p:nvPr>
             <p:ph type="body" idx="1"/>
           </p:nvPr>
@@ -1842,17 +1910,16 @@
           </a:ln>
           <a:extLst>
             <a:ext uri="{C572A759-6A51-4108-AA02-DFA0A04FC94B}">
-              <ma14:wrappingTextBoxFlag xmlns:ma14="http://schemas.microsoft.com/office/mac/drawingml/2011/main" val="1"/>
+              <ma14:wrappingTextBoxFlag xmlns:ma14="http://schemas.microsoft.com/office/mac/drawingml/2011/main" xmlns:a14="http://schemas.microsoft.com/office/drawing/2010/main" xmlns:m="http://schemas.openxmlformats.org/officeDocument/2006/math" xmlns="" val="1"/>
             </a:ext>
           </a:extLst>
         </p:spPr>
         <p:txBody>
           <a:bodyPr lIns="45719" rIns="45719">
-            <a:normAutofit fontScale="100000" lnSpcReduction="0"/>
+            <a:normAutofit/>
           </a:bodyPr>
           <a:lstStyle/>
           <a:p>
-            <a:pPr/>
             <a:r>
               <a:t>Body Level One</a:t>
             </a:r>
@@ -1886,7 +1953,9 @@
       <p:sp>
         <p:nvSpPr>
           <p:cNvPr id="4" name="Slide Number"/>
-          <p:cNvSpPr txBox="1"/>
+          <p:cNvSpPr txBox="1">
+            <a:spLocks noGrp="1"/>
+          </p:cNvSpPr>
           <p:nvPr>
             <p:ph type="sldNum" sz="quarter" idx="2"/>
           </p:nvPr>
@@ -1917,8 +1986,10 @@
             </a:lvl1pPr>
           </a:lstStyle>
           <a:p>
-            <a:pPr/>
-            <a:fld id="{86CB4B4D-7CA3-9044-876B-883B54F8677D}" type="slidenum"/>
+            <a:fld id="{86CB4B4D-7CA3-9044-876B-883B54F8677D}" type="slidenum">
+              <a:t>‹#›</a:t>
+            </a:fld>
+            <a:endParaRPr/>
           </a:p>
         </p:txBody>
       </p:sp>
@@ -1926,17 +1997,17 @@
   </p:cSld>
   <p:clrMap bg1="lt1" tx1="dk1" bg2="lt2" tx2="dk2" accent1="accent1" accent2="accent2" accent3="accent3" accent4="accent4" accent5="accent5" accent6="accent6" hlink="hlink" folHlink="folHlink"/>
   <p:sldLayoutIdLst>
-    <p:sldLayoutId id="2147483649" r:id="rId2"/>
-    <p:sldLayoutId id="2147483650" r:id="rId3"/>
-    <p:sldLayoutId id="2147483651" r:id="rId4"/>
-    <p:sldLayoutId id="2147483652" r:id="rId5"/>
-    <p:sldLayoutId id="2147483653" r:id="rId6"/>
-    <p:sldLayoutId id="2147483654" r:id="rId7"/>
-    <p:sldLayoutId id="2147483655" r:id="rId8"/>
-    <p:sldLayoutId id="2147483656" r:id="rId9"/>
-    <p:sldLayoutId id="2147483657" r:id="rId10"/>
+    <p:sldLayoutId id="2147483649" r:id="rId1"/>
+    <p:sldLayoutId id="2147483650" r:id="rId2"/>
+    <p:sldLayoutId id="2147483651" r:id="rId3"/>
+    <p:sldLayoutId id="2147483652" r:id="rId4"/>
+    <p:sldLayoutId id="2147483653" r:id="rId5"/>
+    <p:sldLayoutId id="2147483654" r:id="rId6"/>
+    <p:sldLayoutId id="2147483655" r:id="rId7"/>
+    <p:sldLayoutId id="2147483656" r:id="rId8"/>
+    <p:sldLayoutId id="2147483657" r:id="rId9"/>
   </p:sldLayoutIdLst>
-  <p:transition xmlns:p14="http://schemas.microsoft.com/office/powerpoint/2010/main" spd="med" advClick="1"/>
+  <p:transition spd="med"/>
   <p:txStyles>
     <p:titleStyle>
       <a:lvl1pPr marL="0" marR="0" indent="0" algn="l" defTabSz="342900" rtl="0" latinLnBrk="0">
@@ -1954,7 +2025,7 @@
         <a:buFontTx/>
         <a:buNone/>
         <a:tabLst/>
-        <a:defRPr b="0" baseline="0" cap="none" i="0" spc="0" strike="noStrike" sz="3300" u="none">
+        <a:defRPr sz="3300" b="0" i="0" u="none" strike="noStrike" cap="none" spc="0" baseline="0">
           <a:solidFill>
             <a:srgbClr val="000000"/>
           </a:solidFill>
@@ -1980,7 +2051,7 @@
         <a:buFontTx/>
         <a:buNone/>
         <a:tabLst/>
-        <a:defRPr b="0" baseline="0" cap="none" i="0" spc="0" strike="noStrike" sz="3300" u="none">
+        <a:defRPr sz="3300" b="0" i="0" u="none" strike="noStrike" cap="none" spc="0" baseline="0">
           <a:solidFill>
             <a:srgbClr val="000000"/>
           </a:solidFill>
@@ -2006,7 +2077,7 @@
         <a:buFontTx/>
         <a:buNone/>
         <a:tabLst/>
-        <a:defRPr b="0" baseline="0" cap="none" i="0" spc="0" strike="noStrike" sz="3300" u="none">
+        <a:defRPr sz="3300" b="0" i="0" u="none" strike="noStrike" cap="none" spc="0" baseline="0">
           <a:solidFill>
             <a:srgbClr val="000000"/>
           </a:solidFill>
@@ -2032,7 +2103,7 @@
         <a:buFontTx/>
         <a:buNone/>
         <a:tabLst/>
-        <a:defRPr b="0" baseline="0" cap="none" i="0" spc="0" strike="noStrike" sz="3300" u="none">
+        <a:defRPr sz="3300" b="0" i="0" u="none" strike="noStrike" cap="none" spc="0" baseline="0">
           <a:solidFill>
             <a:srgbClr val="000000"/>
           </a:solidFill>
@@ -2058,7 +2129,7 @@
         <a:buFontTx/>
         <a:buNone/>
         <a:tabLst/>
-        <a:defRPr b="0" baseline="0" cap="none" i="0" spc="0" strike="noStrike" sz="3300" u="none">
+        <a:defRPr sz="3300" b="0" i="0" u="none" strike="noStrike" cap="none" spc="0" baseline="0">
           <a:solidFill>
             <a:srgbClr val="000000"/>
           </a:solidFill>
@@ -2084,7 +2155,7 @@
         <a:buFontTx/>
         <a:buNone/>
         <a:tabLst/>
-        <a:defRPr b="0" baseline="0" cap="none" i="0" spc="0" strike="noStrike" sz="3300" u="none">
+        <a:defRPr sz="3300" b="0" i="0" u="none" strike="noStrike" cap="none" spc="0" baseline="0">
           <a:solidFill>
             <a:srgbClr val="000000"/>
           </a:solidFill>
@@ -2110,7 +2181,7 @@
         <a:buFontTx/>
         <a:buNone/>
         <a:tabLst/>
-        <a:defRPr b="0" baseline="0" cap="none" i="0" spc="0" strike="noStrike" sz="3300" u="none">
+        <a:defRPr sz="3300" b="0" i="0" u="none" strike="noStrike" cap="none" spc="0" baseline="0">
           <a:solidFill>
             <a:srgbClr val="000000"/>
           </a:solidFill>
@@ -2136,7 +2207,7 @@
         <a:buFontTx/>
         <a:buNone/>
         <a:tabLst/>
-        <a:defRPr b="0" baseline="0" cap="none" i="0" spc="0" strike="noStrike" sz="3300" u="none">
+        <a:defRPr sz="3300" b="0" i="0" u="none" strike="noStrike" cap="none" spc="0" baseline="0">
           <a:solidFill>
             <a:srgbClr val="000000"/>
           </a:solidFill>
@@ -2162,7 +2233,7 @@
         <a:buFontTx/>
         <a:buNone/>
         <a:tabLst/>
-        <a:defRPr b="0" baseline="0" cap="none" i="0" spc="0" strike="noStrike" sz="3300" u="none">
+        <a:defRPr sz="3300" b="0" i="0" u="none" strike="noStrike" cap="none" spc="0" baseline="0">
           <a:solidFill>
             <a:srgbClr val="000000"/>
           </a:solidFill>
@@ -2190,7 +2261,7 @@
         <a:buFont typeface="Arial"/>
         <a:buNone/>
         <a:tabLst/>
-        <a:defRPr b="0" baseline="0" cap="none" i="0" spc="0" strike="noStrike" sz="2400" u="none">
+        <a:defRPr sz="2400" b="0" i="0" u="none" strike="noStrike" cap="none" spc="0" baseline="0">
           <a:solidFill>
             <a:srgbClr val="000000"/>
           </a:solidFill>
@@ -2216,7 +2287,7 @@
         <a:buFont typeface="Arial"/>
         <a:buNone/>
         <a:tabLst/>
-        <a:defRPr b="0" baseline="0" cap="none" i="0" spc="0" strike="noStrike" sz="2400" u="none">
+        <a:defRPr sz="2400" b="0" i="0" u="none" strike="noStrike" cap="none" spc="0" baseline="0">
           <a:solidFill>
             <a:srgbClr val="000000"/>
           </a:solidFill>
@@ -2242,7 +2313,7 @@
         <a:buFont typeface="Arial"/>
         <a:buNone/>
         <a:tabLst/>
-        <a:defRPr b="0" baseline="0" cap="none" i="0" spc="0" strike="noStrike" sz="2400" u="none">
+        <a:defRPr sz="2400" b="0" i="0" u="none" strike="noStrike" cap="none" spc="0" baseline="0">
           <a:solidFill>
             <a:srgbClr val="000000"/>
           </a:solidFill>
@@ -2268,7 +2339,7 @@
         <a:buFont typeface="Arial"/>
         <a:buNone/>
         <a:tabLst/>
-        <a:defRPr b="0" baseline="0" cap="none" i="0" spc="0" strike="noStrike" sz="2400" u="none">
+        <a:defRPr sz="2400" b="0" i="0" u="none" strike="noStrike" cap="none" spc="0" baseline="0">
           <a:solidFill>
             <a:srgbClr val="000000"/>
           </a:solidFill>
@@ -2294,7 +2365,7 @@
         <a:buFont typeface="Arial"/>
         <a:buNone/>
         <a:tabLst/>
-        <a:defRPr b="0" baseline="0" cap="none" i="0" spc="0" strike="noStrike" sz="2400" u="none">
+        <a:defRPr sz="2400" b="0" i="0" u="none" strike="noStrike" cap="none" spc="0" baseline="0">
           <a:solidFill>
             <a:srgbClr val="000000"/>
           </a:solidFill>
@@ -2320,7 +2391,7 @@
         <a:buFont typeface="Arial"/>
         <a:buNone/>
         <a:tabLst/>
-        <a:defRPr b="0" baseline="0" cap="none" i="0" spc="0" strike="noStrike" sz="2400" u="none">
+        <a:defRPr sz="2400" b="0" i="0" u="none" strike="noStrike" cap="none" spc="0" baseline="0">
           <a:solidFill>
             <a:srgbClr val="000000"/>
           </a:solidFill>
@@ -2346,7 +2417,7 @@
         <a:buFont typeface="Arial"/>
         <a:buNone/>
         <a:tabLst/>
-        <a:defRPr b="0" baseline="0" cap="none" i="0" spc="0" strike="noStrike" sz="2400" u="none">
+        <a:defRPr sz="2400" b="0" i="0" u="none" strike="noStrike" cap="none" spc="0" baseline="0">
           <a:solidFill>
             <a:srgbClr val="000000"/>
           </a:solidFill>
@@ -2372,7 +2443,7 @@
         <a:buFont typeface="Arial"/>
         <a:buNone/>
         <a:tabLst/>
-        <a:defRPr b="0" baseline="0" cap="none" i="0" spc="0" strike="noStrike" sz="2400" u="none">
+        <a:defRPr sz="2400" b="0" i="0" u="none" strike="noStrike" cap="none" spc="0" baseline="0">
           <a:solidFill>
             <a:srgbClr val="000000"/>
           </a:solidFill>
@@ -2398,7 +2469,7 @@
         <a:buFont typeface="Arial"/>
         <a:buNone/>
         <a:tabLst/>
-        <a:defRPr b="0" baseline="0" cap="none" i="0" spc="0" strike="noStrike" sz="2400" u="none">
+        <a:defRPr sz="2400" b="0" i="0" u="none" strike="noStrike" cap="none" spc="0" baseline="0">
           <a:solidFill>
             <a:srgbClr val="000000"/>
           </a:solidFill>
@@ -2426,7 +2497,7 @@
         <a:buFontTx/>
         <a:buNone/>
         <a:tabLst/>
-        <a:defRPr b="0" baseline="0" cap="none" i="0" spc="0" strike="noStrike" sz="900" u="none">
+        <a:defRPr sz="900" b="0" i="0" u="none" strike="noStrike" cap="none" spc="0" baseline="0">
           <a:solidFill>
             <a:schemeClr val="tx1"/>
           </a:solidFill>
@@ -2452,7 +2523,7 @@
         <a:buFontTx/>
         <a:buNone/>
         <a:tabLst/>
-        <a:defRPr b="0" baseline="0" cap="none" i="0" spc="0" strike="noStrike" sz="900" u="none">
+        <a:defRPr sz="900" b="0" i="0" u="none" strike="noStrike" cap="none" spc="0" baseline="0">
           <a:solidFill>
             <a:schemeClr val="tx1"/>
           </a:solidFill>
@@ -2478,7 +2549,7 @@
         <a:buFontTx/>
         <a:buNone/>
         <a:tabLst/>
-        <a:defRPr b="0" baseline="0" cap="none" i="0" spc="0" strike="noStrike" sz="900" u="none">
+        <a:defRPr sz="900" b="0" i="0" u="none" strike="noStrike" cap="none" spc="0" baseline="0">
           <a:solidFill>
             <a:schemeClr val="tx1"/>
           </a:solidFill>
@@ -2504,7 +2575,7 @@
         <a:buFontTx/>
         <a:buNone/>
         <a:tabLst/>
-        <a:defRPr b="0" baseline="0" cap="none" i="0" spc="0" strike="noStrike" sz="900" u="none">
+        <a:defRPr sz="900" b="0" i="0" u="none" strike="noStrike" cap="none" spc="0" baseline="0">
           <a:solidFill>
             <a:schemeClr val="tx1"/>
           </a:solidFill>
@@ -2530,7 +2601,7 @@
         <a:buFontTx/>
         <a:buNone/>
         <a:tabLst/>
-        <a:defRPr b="0" baseline="0" cap="none" i="0" spc="0" strike="noStrike" sz="900" u="none">
+        <a:defRPr sz="900" b="0" i="0" u="none" strike="noStrike" cap="none" spc="0" baseline="0">
           <a:solidFill>
             <a:schemeClr val="tx1"/>
           </a:solidFill>
@@ -2556,7 +2627,7 @@
         <a:buFontTx/>
         <a:buNone/>
         <a:tabLst/>
-        <a:defRPr b="0" baseline="0" cap="none" i="0" spc="0" strike="noStrike" sz="900" u="none">
+        <a:defRPr sz="900" b="0" i="0" u="none" strike="noStrike" cap="none" spc="0" baseline="0">
           <a:solidFill>
             <a:schemeClr val="tx1"/>
           </a:solidFill>
@@ -2582,7 +2653,7 @@
         <a:buFontTx/>
         <a:buNone/>
         <a:tabLst/>
-        <a:defRPr b="0" baseline="0" cap="none" i="0" spc="0" strike="noStrike" sz="900" u="none">
+        <a:defRPr sz="900" b="0" i="0" u="none" strike="noStrike" cap="none" spc="0" baseline="0">
           <a:solidFill>
             <a:schemeClr val="tx1"/>
           </a:solidFill>
@@ -2608,7 +2679,7 @@
         <a:buFontTx/>
         <a:buNone/>
         <a:tabLst/>
-        <a:defRPr b="0" baseline="0" cap="none" i="0" spc="0" strike="noStrike" sz="900" u="none">
+        <a:defRPr sz="900" b="0" i="0" u="none" strike="noStrike" cap="none" spc="0" baseline="0">
           <a:solidFill>
             <a:schemeClr val="tx1"/>
           </a:solidFill>
@@ -2634,7 +2705,7 @@
         <a:buFontTx/>
         <a:buNone/>
         <a:tabLst/>
-        <a:defRPr b="0" baseline="0" cap="none" i="0" spc="0" strike="noStrike" sz="900" u="none">
+        <a:defRPr sz="900" b="0" i="0" u="none" strike="noStrike" cap="none" spc="0" baseline="0">
           <a:solidFill>
             <a:schemeClr val="tx1"/>
           </a:solidFill>
@@ -2651,7 +2722,7 @@
 </file>
 
 <file path=ppt/slides/slide1.xml><?xml version="1.0" encoding="utf-8"?>
-<p:sld xmlns:a="http://schemas.openxmlformats.org/drawingml/2006/main" xmlns:r="http://schemas.openxmlformats.org/officeDocument/2006/relationships" xmlns:p="http://schemas.openxmlformats.org/presentationml/2006/main" xmlns:m="http://schemas.openxmlformats.org/officeDocument/2006/math" xmlns:a14="http://schemas.microsoft.com/office/drawing/2010/main" showMasterSp="1" showMasterPhAnim="1">
+<p:sld xmlns:a="http://schemas.openxmlformats.org/drawingml/2006/main" xmlns:r="http://schemas.openxmlformats.org/officeDocument/2006/relationships" xmlns:p="http://schemas.openxmlformats.org/presentationml/2006/main">
   <p:cSld>
     <p:bg>
       <p:bgPr>
@@ -2674,6 +2745,7 @@
           </a:gsLst>
           <a:lin ang="16200000" scaled="0"/>
         </a:gradFill>
+        <a:effectLst/>
       </p:bgPr>
     </p:bg>
     <p:spTree>
@@ -2693,7 +2765,9 @@
       <p:sp>
         <p:nvSpPr>
           <p:cNvPr id="94" name="Title 1"/>
-          <p:cNvSpPr txBox="1"/>
+          <p:cNvSpPr txBox="1">
+            <a:spLocks noGrp="1"/>
+          </p:cNvSpPr>
           <p:nvPr>
             <p:ph type="ctrTitle"/>
           </p:nvPr>
@@ -2715,8 +2789,9 @@
             </a:lvl1pPr>
           </a:lstStyle>
           <a:p>
-            <a:pPr/>
-            <a:r>
+            <a:pPr algn="ctr"/>
+            <a:r>
+              <a:rPr dirty="0"/>
               <a:t>Exploration of Iceland</a:t>
             </a:r>
           </a:p>
@@ -2725,29 +2800,45 @@
       <p:sp>
         <p:nvSpPr>
           <p:cNvPr id="95" name="Subtitle 2"/>
-          <p:cNvSpPr txBox="1"/>
+          <p:cNvSpPr txBox="1">
+            <a:spLocks noGrp="1"/>
+          </p:cNvSpPr>
           <p:nvPr>
             <p:ph type="subTitle" sz="quarter" idx="1"/>
           </p:nvPr>
         </p:nvSpPr>
         <p:spPr>
           <a:xfrm>
-            <a:off x="1371599" y="2200776"/>
-            <a:ext cx="6400801" cy="1314451"/>
+            <a:off x="2319362" y="2571750"/>
+            <a:ext cx="4505275" cy="663288"/>
           </a:xfrm>
           <a:prstGeom prst="rect">
             <a:avLst/>
           </a:prstGeom>
         </p:spPr>
         <p:txBody>
-          <a:bodyPr/>
+          <a:bodyPr>
+            <a:normAutofit fontScale="47500" lnSpcReduction="20000"/>
+          </a:bodyPr>
           <a:lstStyle/>
           <a:p>
-            <a:pPr/>
-            <a:br/>
-            <a:br/>
-            <a:r>
-              <a:t>Presenter: Suheng Yao</a:t>
+            <a:br>
+              <a:rPr dirty="0"/>
+            </a:br>
+            <a:br>
+              <a:rPr dirty="0"/>
+            </a:br>
+            <a:r>
+              <a:rPr sz="4500" dirty="0"/>
+              <a:t>Presenter: </a:t>
+            </a:r>
+            <a:r>
+              <a:rPr sz="4500" dirty="0" err="1"/>
+              <a:t>Suheng</a:t>
+            </a:r>
+            <a:r>
+              <a:rPr sz="4500" dirty="0"/>
+              <a:t> Yao</a:t>
             </a:r>
           </a:p>
         </p:txBody>
@@ -2755,7 +2846,9 @@
       <p:sp>
         <p:nvSpPr>
           <p:cNvPr id="96" name="Slide Number"/>
-          <p:cNvSpPr txBox="1"/>
+          <p:cNvSpPr txBox="1">
+            <a:spLocks noGrp="1"/>
+          </p:cNvSpPr>
           <p:nvPr>
             <p:ph type="sldNum" sz="quarter" idx="4294967295"/>
           </p:nvPr>
@@ -2770,7 +2863,7 @@
           </a:prstGeom>
           <a:extLst>
             <a:ext uri="{C572A759-6A51-4108-AA02-DFA0A04FC94B}">
-              <ma14:wrappingTextBoxFlag xmlns:ma14="http://schemas.microsoft.com/office/mac/drawingml/2011/main" val="1"/>
+              <ma14:wrappingTextBoxFlag xmlns:ma14="http://schemas.microsoft.com/office/mac/drawingml/2011/main" xmlns:a14="http://schemas.microsoft.com/office/drawing/2010/main" xmlns:m="http://schemas.openxmlformats.org/officeDocument/2006/math" xmlns="" val="1"/>
             </a:ext>
           </a:extLst>
         </p:spPr>
@@ -2778,8 +2871,11 @@
           <a:bodyPr/>
           <a:lstStyle/>
           <a:p>
-            <a:pPr/>
-            <a:fld id="{86CB4B4D-7CA3-9044-876B-883B54F8677D}" type="slidenum"/>
+            <a:fld id="{86CB4B4D-7CA3-9044-876B-883B54F8677D}" type="slidenum">
+              <a:rPr/>
+              <a:t>1</a:t>
+            </a:fld>
+            <a:endParaRPr/>
           </a:p>
         </p:txBody>
       </p:sp>
@@ -2788,12 +2884,12 @@
   <p:clrMapOvr>
     <a:masterClrMapping/>
   </p:clrMapOvr>
-  <p:transition xmlns:p14="http://schemas.microsoft.com/office/powerpoint/2010/main" spd="med" advClick="1"/>
+  <p:transition spd="med"/>
 </p:sld>
 </file>
 
 <file path=ppt/slides/slide10.xml><?xml version="1.0" encoding="utf-8"?>
-<p:sld xmlns:a="http://schemas.openxmlformats.org/drawingml/2006/main" xmlns:r="http://schemas.openxmlformats.org/officeDocument/2006/relationships" xmlns:p="http://schemas.openxmlformats.org/presentationml/2006/main" xmlns:m="http://schemas.openxmlformats.org/officeDocument/2006/math" xmlns:a14="http://schemas.microsoft.com/office/drawing/2010/main" showMasterSp="1" showMasterPhAnim="1">
+<p:sld xmlns:a="http://schemas.openxmlformats.org/drawingml/2006/main" xmlns:r="http://schemas.openxmlformats.org/officeDocument/2006/relationships" xmlns:p="http://schemas.openxmlformats.org/presentationml/2006/main">
   <p:cSld>
     <p:bg>
       <p:bgPr>
@@ -2816,6 +2912,7 @@
           </a:gsLst>
           <a:lin ang="16200000" scaled="0"/>
         </a:gradFill>
+        <a:effectLst/>
       </p:bgPr>
     </p:bg>
     <p:spTree>
@@ -2835,7 +2932,9 @@
       <p:sp>
         <p:nvSpPr>
           <p:cNvPr id="125" name="Title 1"/>
-          <p:cNvSpPr txBox="1"/>
+          <p:cNvSpPr txBox="1">
+            <a:spLocks noGrp="1"/>
+          </p:cNvSpPr>
           <p:nvPr>
             <p:ph type="title"/>
           </p:nvPr>
@@ -2849,7 +2948,6 @@
           <a:bodyPr/>
           <a:lstStyle/>
           <a:p>
-            <a:pPr/>
             <a:r>
               <a:t>Reference</a:t>
             </a:r>
@@ -2859,7 +2957,9 @@
       <p:sp>
         <p:nvSpPr>
           <p:cNvPr id="126" name="Content Placeholder 2"/>
-          <p:cNvSpPr txBox="1"/>
+          <p:cNvSpPr txBox="1">
+            <a:spLocks noGrp="1"/>
+          </p:cNvSpPr>
           <p:nvPr>
             <p:ph type="body" idx="1"/>
           </p:nvPr>
@@ -2927,12 +3027,12 @@
   <p:clrMapOvr>
     <a:masterClrMapping/>
   </p:clrMapOvr>
-  <p:transition xmlns:p14="http://schemas.microsoft.com/office/powerpoint/2010/main" spd="med" advClick="1"/>
+  <p:transition spd="med"/>
 </p:sld>
 </file>
 
 <file path=ppt/slides/slide2.xml><?xml version="1.0" encoding="utf-8"?>
-<p:sld xmlns:a="http://schemas.openxmlformats.org/drawingml/2006/main" xmlns:r="http://schemas.openxmlformats.org/officeDocument/2006/relationships" xmlns:p="http://schemas.openxmlformats.org/presentationml/2006/main" xmlns:m="http://schemas.openxmlformats.org/officeDocument/2006/math" xmlns:a14="http://schemas.microsoft.com/office/drawing/2010/main" showMasterSp="1" showMasterPhAnim="1">
+<p:sld xmlns:a="http://schemas.openxmlformats.org/drawingml/2006/main" xmlns:r="http://schemas.openxmlformats.org/officeDocument/2006/relationships" xmlns:p="http://schemas.openxmlformats.org/presentationml/2006/main">
   <p:cSld>
     <p:bg>
       <p:bgPr>
@@ -2955,6 +3055,7 @@
           </a:gsLst>
           <a:lin ang="16200000" scaled="0"/>
         </a:gradFill>
+        <a:effectLst/>
       </p:bgPr>
     </p:bg>
     <p:spTree>
@@ -2974,7 +3075,9 @@
       <p:sp>
         <p:nvSpPr>
           <p:cNvPr id="98" name="Title 1"/>
-          <p:cNvSpPr txBox="1"/>
+          <p:cNvSpPr txBox="1">
+            <a:spLocks noGrp="1"/>
+          </p:cNvSpPr>
           <p:nvPr>
             <p:ph type="title"/>
           </p:nvPr>
@@ -2988,7 +3091,6 @@
           <a:bodyPr/>
           <a:lstStyle/>
           <a:p>
-            <a:pPr/>
             <a:r>
               <a:t>Introduction to Iceland</a:t>
             </a:r>
@@ -2998,7 +3100,9 @@
       <p:sp>
         <p:nvSpPr>
           <p:cNvPr id="99" name="Content Placeholder 2"/>
-          <p:cNvSpPr txBox="1"/>
+          <p:cNvSpPr txBox="1">
+            <a:spLocks noGrp="1"/>
+          </p:cNvSpPr>
           <p:nvPr>
             <p:ph type="body" idx="1"/>
           </p:nvPr>
@@ -3074,12 +3178,12 @@
   <p:clrMapOvr>
     <a:masterClrMapping/>
   </p:clrMapOvr>
-  <p:transition xmlns:p14="http://schemas.microsoft.com/office/powerpoint/2010/main" spd="med" advClick="1"/>
+  <p:transition spd="med"/>
 </p:sld>
 </file>
 
 <file path=ppt/slides/slide3.xml><?xml version="1.0" encoding="utf-8"?>
-<p:sld xmlns:a="http://schemas.openxmlformats.org/drawingml/2006/main" xmlns:r="http://schemas.openxmlformats.org/officeDocument/2006/relationships" xmlns:p="http://schemas.openxmlformats.org/presentationml/2006/main" xmlns:m="http://schemas.openxmlformats.org/officeDocument/2006/math" xmlns:a14="http://schemas.microsoft.com/office/drawing/2010/main" showMasterSp="1" showMasterPhAnim="1">
+<p:sld xmlns:a="http://schemas.openxmlformats.org/drawingml/2006/main" xmlns:r="http://schemas.openxmlformats.org/officeDocument/2006/relationships" xmlns:p="http://schemas.openxmlformats.org/presentationml/2006/main">
   <p:cSld>
     <p:bg>
       <p:bgPr>
@@ -3102,6 +3206,7 @@
           </a:gsLst>
           <a:lin ang="16200000" scaled="0"/>
         </a:gradFill>
+        <a:effectLst/>
       </p:bgPr>
     </p:bg>
     <p:spTree>
@@ -3121,7 +3226,9 @@
       <p:sp>
         <p:nvSpPr>
           <p:cNvPr id="101" name="Title 1"/>
-          <p:cNvSpPr txBox="1"/>
+          <p:cNvSpPr txBox="1">
+            <a:spLocks noGrp="1"/>
+          </p:cNvSpPr>
           <p:nvPr>
             <p:ph type="title"/>
           </p:nvPr>
@@ -3139,11 +3246,10 @@
           <a:bodyPr anchor="ctr"/>
           <a:lstStyle>
             <a:lvl1pPr defTabSz="336042">
-              <a:defRPr b="0" sz="3234"/>
+              <a:defRPr sz="3234" b="0"/>
             </a:lvl1pPr>
           </a:lstStyle>
           <a:p>
-            <a:pPr/>
             <a:r>
               <a:t>Modeling and Projection of GDP</a:t>
             </a:r>
@@ -3159,9 +3265,7 @@
           <p:nvPr/>
         </p:nvPicPr>
         <p:blipFill>
-          <a:blip r:embed="rId2">
-            <a:extLst/>
-          </a:blip>
+          <a:blip r:embed="rId2"/>
           <a:stretch>
             <a:fillRect/>
           </a:stretch>
@@ -3188,16 +3292,14 @@
           <p:nvPr/>
         </p:nvPicPr>
         <p:blipFill>
-          <a:blip r:embed="rId3">
-            <a:extLst/>
-          </a:blip>
+          <a:blip r:embed="rId3"/>
           <a:stretch>
             <a:fillRect/>
           </a:stretch>
         </p:blipFill>
         <p:spPr>
           <a:xfrm>
-            <a:off x="4522016" y="1295399"/>
+            <a:off x="4465794" y="1287780"/>
             <a:ext cx="4678206" cy="2339104"/>
           </a:xfrm>
           <a:prstGeom prst="rect">
@@ -3213,12 +3315,12 @@
   <p:clrMapOvr>
     <a:masterClrMapping/>
   </p:clrMapOvr>
-  <p:transition xmlns:p14="http://schemas.microsoft.com/office/powerpoint/2010/main" spd="med" advClick="1"/>
+  <p:transition spd="med"/>
 </p:sld>
 </file>
 
 <file path=ppt/slides/slide4.xml><?xml version="1.0" encoding="utf-8"?>
-<p:sld xmlns:a="http://schemas.openxmlformats.org/drawingml/2006/main" xmlns:r="http://schemas.openxmlformats.org/officeDocument/2006/relationships" xmlns:p="http://schemas.openxmlformats.org/presentationml/2006/main" xmlns:m="http://schemas.openxmlformats.org/officeDocument/2006/math" xmlns:a14="http://schemas.microsoft.com/office/drawing/2010/main" showMasterSp="1" showMasterPhAnim="1">
+<p:sld xmlns:a="http://schemas.openxmlformats.org/drawingml/2006/main" xmlns:r="http://schemas.openxmlformats.org/officeDocument/2006/relationships" xmlns:p="http://schemas.openxmlformats.org/presentationml/2006/main">
   <p:cSld>
     <p:bg>
       <p:bgPr>
@@ -3241,6 +3343,7 @@
           </a:gsLst>
           <a:lin ang="16200000" scaled="0"/>
         </a:gradFill>
+        <a:effectLst/>
       </p:bgPr>
     </p:bg>
     <p:spTree>
@@ -3260,7 +3363,9 @@
       <p:sp>
         <p:nvSpPr>
           <p:cNvPr id="105" name="Text Placeholder 3"/>
-          <p:cNvSpPr txBox="1"/>
+          <p:cNvSpPr txBox="1">
+            <a:spLocks noGrp="1"/>
+          </p:cNvSpPr>
           <p:nvPr>
             <p:ph type="body" sz="quarter" idx="1"/>
           </p:nvPr>
@@ -3285,7 +3390,6 @@
             </a:lvl1pPr>
           </a:lstStyle>
           <a:p>
-            <a:pPr/>
             <a:r>
               <a:t>Plot ACF and PACF for GDP</a:t>
             </a:r>
@@ -3301,9 +3405,7 @@
           <p:nvPr/>
         </p:nvPicPr>
         <p:blipFill>
-          <a:blip r:embed="rId2">
-            <a:extLst/>
-          </a:blip>
+          <a:blip r:embed="rId2"/>
           <a:stretch>
             <a:fillRect/>
           </a:stretch>
@@ -3340,7 +3442,7 @@
           </a:ln>
           <a:extLst>
             <a:ext uri="{C572A759-6A51-4108-AA02-DFA0A04FC94B}">
-              <ma14:wrappingTextBoxFlag xmlns:ma14="http://schemas.microsoft.com/office/mac/drawingml/2011/main" val="1"/>
+              <ma14:wrappingTextBoxFlag xmlns:ma14="http://schemas.microsoft.com/office/mac/drawingml/2011/main" xmlns:a14="http://schemas.microsoft.com/office/drawing/2010/main" xmlns:m="http://schemas.openxmlformats.org/officeDocument/2006/math" xmlns="" val="1"/>
             </a:ext>
           </a:extLst>
         </p:spPr>
@@ -3358,7 +3460,6 @@
             </a:lvl1pPr>
           </a:lstStyle>
           <a:p>
-            <a:pPr/>
             <a:r>
               <a:t>Based on the plot on the right, both ACF and PACF have significant spike at lag order 1, and since there is first order differencing performed on GDP data, the first model to try is ARIMA(1, 1, 1).</a:t>
             </a:r>
@@ -3371,12 +3472,12 @@
   <p:clrMapOvr>
     <a:masterClrMapping/>
   </p:clrMapOvr>
-  <p:transition xmlns:p14="http://schemas.microsoft.com/office/powerpoint/2010/main" spd="med" advClick="1"/>
+  <p:transition spd="med"/>
 </p:sld>
 </file>
 
 <file path=ppt/slides/slide5.xml><?xml version="1.0" encoding="utf-8"?>
-<p:sld xmlns:a="http://schemas.openxmlformats.org/drawingml/2006/main" xmlns:r="http://schemas.openxmlformats.org/officeDocument/2006/relationships" xmlns:p="http://schemas.openxmlformats.org/presentationml/2006/main" xmlns:m="http://schemas.openxmlformats.org/officeDocument/2006/math" xmlns:a14="http://schemas.microsoft.com/office/drawing/2010/main" showMasterSp="1" showMasterPhAnim="1">
+<p:sld xmlns:a="http://schemas.openxmlformats.org/drawingml/2006/main" xmlns:r="http://schemas.openxmlformats.org/officeDocument/2006/relationships" xmlns:p="http://schemas.openxmlformats.org/presentationml/2006/main">
   <p:cSld>
     <p:bg>
       <p:bgPr>
@@ -3399,6 +3500,7 @@
           </a:gsLst>
           <a:lin ang="16200000" scaled="0"/>
         </a:gradFill>
+        <a:effectLst/>
       </p:bgPr>
     </p:bg>
     <p:spTree>
@@ -3418,7 +3520,9 @@
       <p:sp>
         <p:nvSpPr>
           <p:cNvPr id="109" name="Text Placeholder 3"/>
-          <p:cNvSpPr txBox="1"/>
+          <p:cNvSpPr txBox="1">
+            <a:spLocks noGrp="1"/>
+          </p:cNvSpPr>
           <p:nvPr>
             <p:ph type="body" sz="quarter" idx="1"/>
           </p:nvPr>
@@ -3443,8 +3547,8 @@
             </a:lvl1pPr>
           </a:lstStyle>
           <a:p>
-            <a:pPr/>
-            <a:r>
+            <a:r>
+              <a:rPr dirty="0"/>
               <a:t>Forecast the GDP for Next 15 Years Based on ARIMA(1, 1, 1)</a:t>
             </a:r>
           </a:p>
@@ -3459,9 +3563,7 @@
           <p:nvPr/>
         </p:nvPicPr>
         <p:blipFill>
-          <a:blip r:embed="rId2">
-            <a:extLst/>
-          </a:blip>
+          <a:blip r:embed="rId2"/>
           <a:stretch>
             <a:fillRect/>
           </a:stretch>
@@ -3488,7 +3590,7 @@
         <p:spPr>
           <a:xfrm>
             <a:off x="220285" y="3864433"/>
-            <a:ext cx="8830790" cy="625188"/>
+            <a:ext cx="8918465" cy="697627"/>
           </a:xfrm>
           <a:prstGeom prst="rect">
             <a:avLst/>
@@ -3498,7 +3600,7 @@
           </a:ln>
           <a:extLst>
             <a:ext uri="{C572A759-6A51-4108-AA02-DFA0A04FC94B}">
-              <ma14:wrappingTextBoxFlag xmlns:ma14="http://schemas.microsoft.com/office/mac/drawingml/2011/main" val="1"/>
+              <ma14:wrappingTextBoxFlag xmlns:ma14="http://schemas.microsoft.com/office/mac/drawingml/2011/main" xmlns:a14="http://schemas.microsoft.com/office/drawing/2010/main" xmlns:m="http://schemas.openxmlformats.org/officeDocument/2006/math" xmlns="" val="1"/>
             </a:ext>
           </a:extLst>
         </p:spPr>
@@ -3516,9 +3618,16 @@
             </a:lvl1pPr>
           </a:lstStyle>
           <a:p>
-            <a:pPr/>
-            <a:r>
-              <a:t>Based on the forecast values above, the GDP is predicted to decrease and become gradually stable at around $700,000,000 per year.</a:t>
+            <a:r>
+              <a:rPr dirty="0"/>
+              <a:t>Based on the forecast values above, the GDP is predicted to decrease and become gradually </a:t>
+            </a:r>
+            <a:endParaRPr lang="en-CA" dirty="0"/>
+          </a:p>
+          <a:p>
+            <a:r>
+              <a:rPr dirty="0"/>
+              <a:t>stable at around $700,000,000 per year.</a:t>
             </a:r>
           </a:p>
         </p:txBody>
@@ -3528,12 +3637,12 @@
   <p:clrMapOvr>
     <a:masterClrMapping/>
   </p:clrMapOvr>
-  <p:transition xmlns:p14="http://schemas.microsoft.com/office/powerpoint/2010/main" spd="med" advClick="1"/>
+  <p:transition spd="med"/>
 </p:sld>
 </file>
 
 <file path=ppt/slides/slide6.xml><?xml version="1.0" encoding="utf-8"?>
-<p:sld xmlns:a="http://schemas.openxmlformats.org/drawingml/2006/main" xmlns:r="http://schemas.openxmlformats.org/officeDocument/2006/relationships" xmlns:p="http://schemas.openxmlformats.org/presentationml/2006/main" xmlns:m="http://schemas.openxmlformats.org/officeDocument/2006/math" xmlns:a14="http://schemas.microsoft.com/office/drawing/2010/main" showMasterSp="1" showMasterPhAnim="1">
+<p:sld xmlns:a="http://schemas.openxmlformats.org/drawingml/2006/main" xmlns:r="http://schemas.openxmlformats.org/officeDocument/2006/relationships" xmlns:p="http://schemas.openxmlformats.org/presentationml/2006/main">
   <p:cSld>
     <p:bg>
       <p:bgPr>
@@ -3556,6 +3665,7 @@
           </a:gsLst>
           <a:lin ang="16200000" scaled="0"/>
         </a:gradFill>
+        <a:effectLst/>
       </p:bgPr>
     </p:bg>
     <p:spTree>
@@ -3575,7 +3685,9 @@
       <p:sp>
         <p:nvSpPr>
           <p:cNvPr id="113" name="Title 1"/>
-          <p:cNvSpPr txBox="1"/>
+          <p:cNvSpPr txBox="1">
+            <a:spLocks noGrp="1"/>
+          </p:cNvSpPr>
           <p:nvPr>
             <p:ph type="title"/>
           </p:nvPr>
@@ -3593,11 +3705,10 @@
           <a:bodyPr anchor="ctr"/>
           <a:lstStyle>
             <a:lvl1pPr>
-              <a:defRPr b="0" sz="3300"/>
+              <a:defRPr sz="3300" b="0"/>
             </a:lvl1pPr>
           </a:lstStyle>
           <a:p>
-            <a:pPr/>
             <a:r>
               <a:t>Comparison with Greenland</a:t>
             </a:r>
@@ -3613,9 +3724,7 @@
           <p:nvPr/>
         </p:nvPicPr>
         <p:blipFill>
-          <a:blip r:embed="rId2">
-            <a:extLst/>
-          </a:blip>
+          <a:blip r:embed="rId2"/>
           <a:stretch>
             <a:fillRect/>
           </a:stretch>
@@ -3638,12 +3747,12 @@
   <p:clrMapOvr>
     <a:masterClrMapping/>
   </p:clrMapOvr>
-  <p:transition xmlns:p14="http://schemas.microsoft.com/office/powerpoint/2010/main" spd="med" advClick="1"/>
+  <p:transition spd="med"/>
 </p:sld>
 </file>
 
 <file path=ppt/slides/slide7.xml><?xml version="1.0" encoding="utf-8"?>
-<p:sld xmlns:a="http://schemas.openxmlformats.org/drawingml/2006/main" xmlns:r="http://schemas.openxmlformats.org/officeDocument/2006/relationships" xmlns:p="http://schemas.openxmlformats.org/presentationml/2006/main" xmlns:m="http://schemas.openxmlformats.org/officeDocument/2006/math" xmlns:a14="http://schemas.microsoft.com/office/drawing/2010/main" showMasterSp="1" showMasterPhAnim="1">
+<p:sld xmlns:a="http://schemas.openxmlformats.org/drawingml/2006/main" xmlns:r="http://schemas.openxmlformats.org/officeDocument/2006/relationships" xmlns:p="http://schemas.openxmlformats.org/presentationml/2006/main">
   <p:cSld>
     <p:bg>
       <p:bgPr>
@@ -3666,6 +3775,7 @@
           </a:gsLst>
           <a:lin ang="16200000" scaled="0"/>
         </a:gradFill>
+        <a:effectLst/>
       </p:bgPr>
     </p:bg>
     <p:spTree>
@@ -3685,7 +3795,9 @@
       <p:sp>
         <p:nvSpPr>
           <p:cNvPr id="116" name="Text Placeholder 3"/>
-          <p:cNvSpPr txBox="1"/>
+          <p:cNvSpPr txBox="1">
+            <a:spLocks noGrp="1"/>
+          </p:cNvSpPr>
           <p:nvPr>
             <p:ph type="body" sz="quarter" idx="1"/>
           </p:nvPr>
@@ -3710,7 +3822,6 @@
             </a:lvl1pPr>
           </a:lstStyle>
           <a:p>
-            <a:pPr/>
             <a:r>
               <a:t>Comparison of Life Expectancy</a:t>
             </a:r>
@@ -3726,9 +3837,7 @@
           <p:nvPr/>
         </p:nvPicPr>
         <p:blipFill>
-          <a:blip r:embed="rId2">
-            <a:extLst/>
-          </a:blip>
+          <a:blip r:embed="rId2"/>
           <a:stretch>
             <a:fillRect/>
           </a:stretch>
@@ -3751,12 +3860,12 @@
   <p:clrMapOvr>
     <a:masterClrMapping/>
   </p:clrMapOvr>
-  <p:transition xmlns:p14="http://schemas.microsoft.com/office/powerpoint/2010/main" spd="med" advClick="1"/>
+  <p:transition spd="med"/>
 </p:sld>
 </file>
 
 <file path=ppt/slides/slide8.xml><?xml version="1.0" encoding="utf-8"?>
-<p:sld xmlns:a="http://schemas.openxmlformats.org/drawingml/2006/main" xmlns:r="http://schemas.openxmlformats.org/officeDocument/2006/relationships" xmlns:p="http://schemas.openxmlformats.org/presentationml/2006/main" xmlns:m="http://schemas.openxmlformats.org/officeDocument/2006/math" xmlns:a14="http://schemas.microsoft.com/office/drawing/2010/main" showMasterSp="1" showMasterPhAnim="1">
+<p:sld xmlns:a="http://schemas.openxmlformats.org/drawingml/2006/main" xmlns:r="http://schemas.openxmlformats.org/officeDocument/2006/relationships" xmlns:p="http://schemas.openxmlformats.org/presentationml/2006/main">
   <p:cSld>
     <p:bg>
       <p:bgPr>
@@ -3779,6 +3888,7 @@
           </a:gsLst>
           <a:lin ang="16200000" scaled="0"/>
         </a:gradFill>
+        <a:effectLst/>
       </p:bgPr>
     </p:bg>
     <p:spTree>
@@ -3798,7 +3908,9 @@
       <p:sp>
         <p:nvSpPr>
           <p:cNvPr id="119" name="Text Placeholder 3"/>
-          <p:cNvSpPr txBox="1"/>
+          <p:cNvSpPr txBox="1">
+            <a:spLocks noGrp="1"/>
+          </p:cNvSpPr>
           <p:nvPr>
             <p:ph type="body" sz="quarter" idx="1"/>
           </p:nvPr>
@@ -3823,7 +3935,6 @@
             </a:lvl1pPr>
           </a:lstStyle>
           <a:p>
-            <a:pPr/>
             <a:r>
               <a:t>Comparison of Intentional Homicide</a:t>
             </a:r>
@@ -3839,9 +3950,7 @@
           <p:nvPr/>
         </p:nvPicPr>
         <p:blipFill>
-          <a:blip r:embed="rId2">
-            <a:extLst/>
-          </a:blip>
+          <a:blip r:embed="rId2"/>
           <a:stretch>
             <a:fillRect/>
           </a:stretch>
@@ -3864,12 +3973,12 @@
   <p:clrMapOvr>
     <a:masterClrMapping/>
   </p:clrMapOvr>
-  <p:transition xmlns:p14="http://schemas.microsoft.com/office/powerpoint/2010/main" spd="med" advClick="1"/>
+  <p:transition spd="med"/>
 </p:sld>
 </file>
 
 <file path=ppt/slides/slide9.xml><?xml version="1.0" encoding="utf-8"?>
-<p:sld xmlns:a="http://schemas.openxmlformats.org/drawingml/2006/main" xmlns:r="http://schemas.openxmlformats.org/officeDocument/2006/relationships" xmlns:p="http://schemas.openxmlformats.org/presentationml/2006/main" xmlns:m="http://schemas.openxmlformats.org/officeDocument/2006/math" xmlns:a14="http://schemas.microsoft.com/office/drawing/2010/main" showMasterSp="1" showMasterPhAnim="1">
+<p:sld xmlns:a="http://schemas.openxmlformats.org/drawingml/2006/main" xmlns:r="http://schemas.openxmlformats.org/officeDocument/2006/relationships" xmlns:p="http://schemas.openxmlformats.org/presentationml/2006/main">
   <p:cSld>
     <p:bg>
       <p:bgPr>
@@ -3892,6 +4001,7 @@
           </a:gsLst>
           <a:lin ang="16200000" scaled="0"/>
         </a:gradFill>
+        <a:effectLst/>
       </p:bgPr>
     </p:bg>
     <p:spTree>
@@ -3911,7 +4021,9 @@
       <p:sp>
         <p:nvSpPr>
           <p:cNvPr id="122" name="Title 1"/>
-          <p:cNvSpPr txBox="1"/>
+          <p:cNvSpPr txBox="1">
+            <a:spLocks noGrp="1"/>
+          </p:cNvSpPr>
           <p:nvPr>
             <p:ph type="title"/>
           </p:nvPr>
@@ -3925,7 +4037,6 @@
           <a:bodyPr/>
           <a:lstStyle/>
           <a:p>
-            <a:pPr/>
             <a:r>
               <a:t>SWOT Analysis</a:t>
             </a:r>
@@ -3935,7 +4046,9 @@
       <p:sp>
         <p:nvSpPr>
           <p:cNvPr id="123" name="Content Placeholder 2"/>
-          <p:cNvSpPr txBox="1"/>
+          <p:cNvSpPr txBox="1">
+            <a:spLocks noGrp="1"/>
+          </p:cNvSpPr>
           <p:nvPr>
             <p:ph type="body" idx="1"/>
           </p:nvPr>
@@ -3957,7 +4070,7 @@
               <a:spcBef>
                 <a:spcPts val="1200"/>
               </a:spcBef>
-              <a:defRPr b="1" sz="1394"/>
+              <a:defRPr sz="1394" b="1"/>
             </a:pPr>
             <a:r>
               <a:t>Strength</a:t>
@@ -4007,7 +4120,7 @@
               <a:spcBef>
                 <a:spcPts val="1200"/>
               </a:spcBef>
-              <a:defRPr b="1" sz="1394"/>
+              <a:defRPr sz="1394" b="1"/>
             </a:pPr>
             <a:r>
               <a:t>Weakness</a:t>
@@ -4044,7 +4157,7 @@
               <a:spcBef>
                 <a:spcPts val="1200"/>
               </a:spcBef>
-              <a:defRPr b="1" sz="1394"/>
+              <a:defRPr sz="1394" b="1"/>
             </a:pPr>
             <a:r>
               <a:t>Opportunities</a:t>
@@ -4081,7 +4194,7 @@
               <a:spcBef>
                 <a:spcPts val="1200"/>
               </a:spcBef>
-              <a:defRPr b="1" sz="1394"/>
+              <a:defRPr sz="1394" b="1"/>
             </a:pPr>
             <a:r>
               <a:t>Threat</a:t>
@@ -4120,12 +4233,12 @@
   <p:clrMapOvr>
     <a:masterClrMapping/>
   </p:clrMapOvr>
-  <p:transition xmlns:p14="http://schemas.microsoft.com/office/powerpoint/2010/main" spd="med" advClick="1"/>
+  <p:transition spd="med"/>
 </p:sld>
 </file>
 
 <file path=ppt/theme/theme1.xml><?xml version="1.0" encoding="utf-8"?>
-<a:theme xmlns:a="http://schemas.openxmlformats.org/drawingml/2006/main" xmlns:r="http://schemas.openxmlformats.org/officeDocument/2006/relationships" name="Office Theme">
+<a:theme xmlns:a="http://schemas.openxmlformats.org/drawingml/2006/main" name="Office Theme">
   <a:themeElements>
     <a:clrScheme name="Office Theme">
       <a:dk1>
@@ -4251,7 +4364,7 @@
       <a:effectStyleLst>
         <a:effectStyle>
           <a:effectLst>
-            <a:outerShdw sx="100000" sy="100000" kx="0" ky="0" algn="b" rotWithShape="0" blurRad="38100" dist="23000" dir="5400000">
+            <a:outerShdw blurRad="38100" dist="23000" dir="5400000" rotWithShape="0">
               <a:srgbClr val="000000">
                 <a:alpha val="35000"/>
               </a:srgbClr>
@@ -4260,7 +4373,7 @@
         </a:effectStyle>
         <a:effectStyle>
           <a:effectLst>
-            <a:outerShdw sx="100000" sy="100000" kx="0" ky="0" algn="b" rotWithShape="0" blurRad="38100" dist="23000" dir="5400000">
+            <a:outerShdw blurRad="38100" dist="23000" dir="5400000" rotWithShape="0">
               <a:srgbClr val="000000">
                 <a:alpha val="35000"/>
               </a:srgbClr>
@@ -4269,7 +4382,7 @@
         </a:effectStyle>
         <a:effectStyle>
           <a:effectLst>
-            <a:outerShdw sx="100000" sy="100000" kx="0" ky="0" algn="b" rotWithShape="0" blurRad="38100" dist="20000" dir="5400000">
+            <a:outerShdw blurRad="38100" dist="20000" dir="5400000" rotWithShape="0">
               <a:srgbClr val="000000">
                 <a:alpha val="38000"/>
               </a:srgbClr>
@@ -4343,7 +4456,7 @@
           <a:round/>
         </a:ln>
         <a:effectLst>
-          <a:outerShdw sx="100000" sy="100000" kx="0" ky="0" algn="b" rotWithShape="0" blurRad="38100" dist="23000" dir="5400000">
+          <a:outerShdw blurRad="38100" dist="23000" dir="5400000" rotWithShape="0">
             <a:srgbClr val="000000">
               <a:alpha val="35000"/>
             </a:srgbClr>
@@ -4351,7 +4464,7 @@
         </a:effectLst>
         <a:sp3d/>
       </a:spPr>
-      <a:bodyPr rot="0" spcFirstLastPara="1" vertOverflow="overflow" horzOverflow="overflow" vert="horz" wrap="square" lIns="45719" tIns="45719" rIns="45719" bIns="45719" numCol="1" spcCol="38100" rtlCol="0" anchor="ctr" upright="0">
+      <a:bodyPr rot="0" spcFirstLastPara="1" vertOverflow="overflow" horzOverflow="overflow" vert="horz" wrap="square" lIns="45719" tIns="45719" rIns="45719" bIns="45719" numCol="1" spcCol="38100" rtlCol="0" anchor="ctr">
         <a:spAutoFit/>
       </a:bodyPr>
       <a:lstStyle>
@@ -4370,7 +4483,7 @@
           <a:buFontTx/>
           <a:buNone/>
           <a:tabLst/>
-          <a:defRPr b="0" baseline="0" cap="none" i="0" spc="0" strike="noStrike" sz="1800" u="none" kumimoji="0" normalizeH="0">
+          <a:defRPr kumimoji="0" sz="1800" b="0" i="0" u="none" strike="noStrike" cap="none" spc="0" normalizeH="0" baseline="0">
             <a:ln>
               <a:noFill/>
             </a:ln>
@@ -4400,7 +4513,7 @@
           <a:buFontTx/>
           <a:buNone/>
           <a:tabLst/>
-          <a:defRPr b="0" baseline="0" cap="none" i="0" spc="0" strike="noStrike" sz="1800" u="none" kumimoji="0" normalizeH="0">
+          <a:defRPr kumimoji="0" sz="1800" b="0" i="0" u="none" strike="noStrike" cap="none" spc="0" normalizeH="0" baseline="0">
             <a:ln>
               <a:noFill/>
             </a:ln>
@@ -4426,7 +4539,7 @@
           <a:buFontTx/>
           <a:buNone/>
           <a:tabLst/>
-          <a:defRPr b="0" baseline="0" cap="none" i="0" spc="0" strike="noStrike" sz="1800" u="none" kumimoji="0" normalizeH="0">
+          <a:defRPr kumimoji="0" sz="1800" b="0" i="0" u="none" strike="noStrike" cap="none" spc="0" normalizeH="0" baseline="0">
             <a:ln>
               <a:noFill/>
             </a:ln>
@@ -4452,7 +4565,7 @@
           <a:buFontTx/>
           <a:buNone/>
           <a:tabLst/>
-          <a:defRPr b="0" baseline="0" cap="none" i="0" spc="0" strike="noStrike" sz="1800" u="none" kumimoji="0" normalizeH="0">
+          <a:defRPr kumimoji="0" sz="1800" b="0" i="0" u="none" strike="noStrike" cap="none" spc="0" normalizeH="0" baseline="0">
             <a:ln>
               <a:noFill/>
             </a:ln>
@@ -4478,7 +4591,7 @@
           <a:buFontTx/>
           <a:buNone/>
           <a:tabLst/>
-          <a:defRPr b="0" baseline="0" cap="none" i="0" spc="0" strike="noStrike" sz="1800" u="none" kumimoji="0" normalizeH="0">
+          <a:defRPr kumimoji="0" sz="1800" b="0" i="0" u="none" strike="noStrike" cap="none" spc="0" normalizeH="0" baseline="0">
             <a:ln>
               <a:noFill/>
             </a:ln>
@@ -4504,7 +4617,7 @@
           <a:buFontTx/>
           <a:buNone/>
           <a:tabLst/>
-          <a:defRPr b="0" baseline="0" cap="none" i="0" spc="0" strike="noStrike" sz="1800" u="none" kumimoji="0" normalizeH="0">
+          <a:defRPr kumimoji="0" sz="1800" b="0" i="0" u="none" strike="noStrike" cap="none" spc="0" normalizeH="0" baseline="0">
             <a:ln>
               <a:noFill/>
             </a:ln>
@@ -4530,7 +4643,7 @@
           <a:buFontTx/>
           <a:buNone/>
           <a:tabLst/>
-          <a:defRPr b="0" baseline="0" cap="none" i="0" spc="0" strike="noStrike" sz="1800" u="none" kumimoji="0" normalizeH="0">
+          <a:defRPr kumimoji="0" sz="1800" b="0" i="0" u="none" strike="noStrike" cap="none" spc="0" normalizeH="0" baseline="0">
             <a:ln>
               <a:noFill/>
             </a:ln>
@@ -4556,7 +4669,7 @@
           <a:buFontTx/>
           <a:buNone/>
           <a:tabLst/>
-          <a:defRPr b="0" baseline="0" cap="none" i="0" spc="0" strike="noStrike" sz="1800" u="none" kumimoji="0" normalizeH="0">
+          <a:defRPr kumimoji="0" sz="1800" b="0" i="0" u="none" strike="noStrike" cap="none" spc="0" normalizeH="0" baseline="0">
             <a:ln>
               <a:noFill/>
             </a:ln>
@@ -4582,7 +4695,7 @@
           <a:buFontTx/>
           <a:buNone/>
           <a:tabLst/>
-          <a:defRPr b="0" baseline="0" cap="none" i="0" spc="0" strike="noStrike" sz="1800" u="none" kumimoji="0" normalizeH="0">
+          <a:defRPr kumimoji="0" sz="1800" b="0" i="0" u="none" strike="noStrike" cap="none" spc="0" normalizeH="0" baseline="0">
             <a:ln>
               <a:noFill/>
             </a:ln>
@@ -4608,7 +4721,7 @@
           <a:buFontTx/>
           <a:buNone/>
           <a:tabLst/>
-          <a:defRPr b="0" baseline="0" cap="none" i="0" spc="0" strike="noStrike" sz="1800" u="none" kumimoji="0" normalizeH="0">
+          <a:defRPr kumimoji="0" sz="1800" b="0" i="0" u="none" strike="noStrike" cap="none" spc="0" normalizeH="0" baseline="0">
             <a:ln>
               <a:noFill/>
             </a:ln>
@@ -4621,9 +4734,15 @@
         </a:lvl9pPr>
       </a:lstStyle>
       <a:style>
-        <a:lnRef idx="0"/>
-        <a:fillRef idx="0"/>
-        <a:effectRef idx="0"/>
+        <a:lnRef idx="0">
+          <a:scrgbClr r="0" g="0" b="0"/>
+        </a:lnRef>
+        <a:fillRef idx="0">
+          <a:scrgbClr r="0" g="0" b="0"/>
+        </a:fillRef>
+        <a:effectRef idx="0">
+          <a:scrgbClr r="0" g="0" b="0"/>
+        </a:effectRef>
         <a:fontRef idx="none"/>
       </a:style>
     </a:spDef>
@@ -4638,7 +4757,7 @@
           <a:round/>
         </a:ln>
         <a:effectLst>
-          <a:outerShdw sx="100000" sy="100000" kx="0" ky="0" algn="b" rotWithShape="0" blurRad="38100" dist="20000" dir="5400000">
+          <a:outerShdw blurRad="38100" dist="20000" dir="5400000" rotWithShape="0">
             <a:srgbClr val="000000">
               <a:alpha val="38000"/>
             </a:srgbClr>
@@ -4646,7 +4765,7 @@
         </a:effectLst>
         <a:sp3d/>
       </a:spPr>
-      <a:bodyPr rot="0" spcFirstLastPara="1" vertOverflow="overflow" horzOverflow="overflow" vert="horz" wrap="square" lIns="91439" tIns="45719" rIns="91439" bIns="45719" numCol="1" spcCol="38100" rtlCol="0" anchor="t" upright="0">
+      <a:bodyPr rot="0" spcFirstLastPara="1" vertOverflow="overflow" horzOverflow="overflow" vert="horz" wrap="square" lIns="91439" tIns="45719" rIns="91439" bIns="45719" numCol="1" spcCol="38100" rtlCol="0" anchor="t">
         <a:noAutofit/>
       </a:bodyPr>
       <a:lstStyle>
@@ -4665,7 +4784,7 @@
           <a:buFontTx/>
           <a:buNone/>
           <a:tabLst/>
-          <a:defRPr b="0" baseline="0" cap="none" i="0" spc="0" strike="noStrike" sz="1800" u="none" kumimoji="0" normalizeH="0">
+          <a:defRPr kumimoji="0" sz="1800" b="0" i="0" u="none" strike="noStrike" cap="none" spc="0" normalizeH="0" baseline="0">
             <a:ln>
               <a:noFill/>
             </a:ln>
@@ -4691,7 +4810,7 @@
           <a:buFontTx/>
           <a:buNone/>
           <a:tabLst/>
-          <a:defRPr b="0" baseline="0" cap="none" i="0" spc="0" strike="noStrike" sz="1800" u="none" kumimoji="0" normalizeH="0">
+          <a:defRPr kumimoji="0" sz="1800" b="0" i="0" u="none" strike="noStrike" cap="none" spc="0" normalizeH="0" baseline="0">
             <a:ln>
               <a:noFill/>
             </a:ln>
@@ -4717,7 +4836,7 @@
           <a:buFontTx/>
           <a:buNone/>
           <a:tabLst/>
-          <a:defRPr b="0" baseline="0" cap="none" i="0" spc="0" strike="noStrike" sz="1800" u="none" kumimoji="0" normalizeH="0">
+          <a:defRPr kumimoji="0" sz="1800" b="0" i="0" u="none" strike="noStrike" cap="none" spc="0" normalizeH="0" baseline="0">
             <a:ln>
               <a:noFill/>
             </a:ln>
@@ -4743,7 +4862,7 @@
           <a:buFontTx/>
           <a:buNone/>
           <a:tabLst/>
-          <a:defRPr b="0" baseline="0" cap="none" i="0" spc="0" strike="noStrike" sz="1800" u="none" kumimoji="0" normalizeH="0">
+          <a:defRPr kumimoji="0" sz="1800" b="0" i="0" u="none" strike="noStrike" cap="none" spc="0" normalizeH="0" baseline="0">
             <a:ln>
               <a:noFill/>
             </a:ln>
@@ -4769,7 +4888,7 @@
           <a:buFontTx/>
           <a:buNone/>
           <a:tabLst/>
-          <a:defRPr b="0" baseline="0" cap="none" i="0" spc="0" strike="noStrike" sz="1800" u="none" kumimoji="0" normalizeH="0">
+          <a:defRPr kumimoji="0" sz="1800" b="0" i="0" u="none" strike="noStrike" cap="none" spc="0" normalizeH="0" baseline="0">
             <a:ln>
               <a:noFill/>
             </a:ln>
@@ -4795,7 +4914,7 @@
           <a:buFontTx/>
           <a:buNone/>
           <a:tabLst/>
-          <a:defRPr b="0" baseline="0" cap="none" i="0" spc="0" strike="noStrike" sz="1800" u="none" kumimoji="0" normalizeH="0">
+          <a:defRPr kumimoji="0" sz="1800" b="0" i="0" u="none" strike="noStrike" cap="none" spc="0" normalizeH="0" baseline="0">
             <a:ln>
               <a:noFill/>
             </a:ln>
@@ -4821,7 +4940,7 @@
           <a:buFontTx/>
           <a:buNone/>
           <a:tabLst/>
-          <a:defRPr b="0" baseline="0" cap="none" i="0" spc="0" strike="noStrike" sz="1800" u="none" kumimoji="0" normalizeH="0">
+          <a:defRPr kumimoji="0" sz="1800" b="0" i="0" u="none" strike="noStrike" cap="none" spc="0" normalizeH="0" baseline="0">
             <a:ln>
               <a:noFill/>
             </a:ln>
@@ -4847,7 +4966,7 @@
           <a:buFontTx/>
           <a:buNone/>
           <a:tabLst/>
-          <a:defRPr b="0" baseline="0" cap="none" i="0" spc="0" strike="noStrike" sz="1800" u="none" kumimoji="0" normalizeH="0">
+          <a:defRPr kumimoji="0" sz="1800" b="0" i="0" u="none" strike="noStrike" cap="none" spc="0" normalizeH="0" baseline="0">
             <a:ln>
               <a:noFill/>
             </a:ln>
@@ -4873,7 +4992,7 @@
           <a:buFontTx/>
           <a:buNone/>
           <a:tabLst/>
-          <a:defRPr b="0" baseline="0" cap="none" i="0" spc="0" strike="noStrike" sz="1800" u="none" kumimoji="0" normalizeH="0">
+          <a:defRPr kumimoji="0" sz="1800" b="0" i="0" u="none" strike="noStrike" cap="none" spc="0" normalizeH="0" baseline="0">
             <a:ln>
               <a:noFill/>
             </a:ln>
@@ -4899,7 +5018,7 @@
           <a:buFontTx/>
           <a:buNone/>
           <a:tabLst/>
-          <a:defRPr b="0" baseline="0" cap="none" i="0" spc="0" strike="noStrike" sz="1800" u="none" kumimoji="0" normalizeH="0">
+          <a:defRPr kumimoji="0" sz="1800" b="0" i="0" u="none" strike="noStrike" cap="none" spc="0" normalizeH="0" baseline="0">
             <a:ln>
               <a:noFill/>
             </a:ln>
@@ -4912,9 +5031,15 @@
         </a:lvl9pPr>
       </a:lstStyle>
       <a:style>
-        <a:lnRef idx="0"/>
-        <a:fillRef idx="0"/>
-        <a:effectRef idx="0"/>
+        <a:lnRef idx="0">
+          <a:scrgbClr r="0" g="0" b="0"/>
+        </a:lnRef>
+        <a:fillRef idx="0">
+          <a:scrgbClr r="0" g="0" b="0"/>
+        </a:fillRef>
+        <a:effectRef idx="0">
+          <a:scrgbClr r="0" g="0" b="0"/>
+        </a:effectRef>
         <a:fontRef idx="none"/>
       </a:style>
     </a:lnDef>
@@ -4928,7 +5053,7 @@
         <a:effectLst/>
         <a:sp3d/>
       </a:spPr>
-      <a:bodyPr rot="0" spcFirstLastPara="1" vertOverflow="overflow" horzOverflow="overflow" vert="horz" wrap="square" lIns="45719" tIns="45719" rIns="45719" bIns="45719" numCol="1" spcCol="38100" rtlCol="0" anchor="t" upright="0">
+      <a:bodyPr rot="0" spcFirstLastPara="1" vertOverflow="overflow" horzOverflow="overflow" vert="horz" wrap="square" lIns="45719" tIns="45719" rIns="45719" bIns="45719" numCol="1" spcCol="38100" rtlCol="0" anchor="t">
         <a:spAutoFit/>
       </a:bodyPr>
       <a:lstStyle>
@@ -4947,7 +5072,7 @@
           <a:buFontTx/>
           <a:buNone/>
           <a:tabLst/>
-          <a:defRPr b="0" baseline="0" cap="none" i="0" spc="0" strike="noStrike" sz="1800" u="none" kumimoji="0" normalizeH="0">
+          <a:defRPr kumimoji="0" sz="1800" b="0" i="0" u="none" strike="noStrike" cap="none" spc="0" normalizeH="0" baseline="0">
             <a:ln>
               <a:noFill/>
             </a:ln>
@@ -4977,7 +5102,7 @@
           <a:buFontTx/>
           <a:buNone/>
           <a:tabLst/>
-          <a:defRPr b="0" baseline="0" cap="none" i="0" spc="0" strike="noStrike" sz="1800" u="none" kumimoji="0" normalizeH="0">
+          <a:defRPr kumimoji="0" sz="1800" b="0" i="0" u="none" strike="noStrike" cap="none" spc="0" normalizeH="0" baseline="0">
             <a:ln>
               <a:noFill/>
             </a:ln>
@@ -5003,7 +5128,7 @@
           <a:buFontTx/>
           <a:buNone/>
           <a:tabLst/>
-          <a:defRPr b="0" baseline="0" cap="none" i="0" spc="0" strike="noStrike" sz="1800" u="none" kumimoji="0" normalizeH="0">
+          <a:defRPr kumimoji="0" sz="1800" b="0" i="0" u="none" strike="noStrike" cap="none" spc="0" normalizeH="0" baseline="0">
             <a:ln>
               <a:noFill/>
             </a:ln>
@@ -5029,7 +5154,7 @@
           <a:buFontTx/>
           <a:buNone/>
           <a:tabLst/>
-          <a:defRPr b="0" baseline="0" cap="none" i="0" spc="0" strike="noStrike" sz="1800" u="none" kumimoji="0" normalizeH="0">
+          <a:defRPr kumimoji="0" sz="1800" b="0" i="0" u="none" strike="noStrike" cap="none" spc="0" normalizeH="0" baseline="0">
             <a:ln>
               <a:noFill/>
             </a:ln>
@@ -5055,7 +5180,7 @@
           <a:buFontTx/>
           <a:buNone/>
           <a:tabLst/>
-          <a:defRPr b="0" baseline="0" cap="none" i="0" spc="0" strike="noStrike" sz="1800" u="none" kumimoji="0" normalizeH="0">
+          <a:defRPr kumimoji="0" sz="1800" b="0" i="0" u="none" strike="noStrike" cap="none" spc="0" normalizeH="0" baseline="0">
             <a:ln>
               <a:noFill/>
             </a:ln>
@@ -5081,7 +5206,7 @@
           <a:buFontTx/>
           <a:buNone/>
           <a:tabLst/>
-          <a:defRPr b="0" baseline="0" cap="none" i="0" spc="0" strike="noStrike" sz="1800" u="none" kumimoji="0" normalizeH="0">
+          <a:defRPr kumimoji="0" sz="1800" b="0" i="0" u="none" strike="noStrike" cap="none" spc="0" normalizeH="0" baseline="0">
             <a:ln>
               <a:noFill/>
             </a:ln>
@@ -5107,7 +5232,7 @@
           <a:buFontTx/>
           <a:buNone/>
           <a:tabLst/>
-          <a:defRPr b="0" baseline="0" cap="none" i="0" spc="0" strike="noStrike" sz="1800" u="none" kumimoji="0" normalizeH="0">
+          <a:defRPr kumimoji="0" sz="1800" b="0" i="0" u="none" strike="noStrike" cap="none" spc="0" normalizeH="0" baseline="0">
             <a:ln>
               <a:noFill/>
             </a:ln>
@@ -5133,7 +5258,7 @@
           <a:buFontTx/>
           <a:buNone/>
           <a:tabLst/>
-          <a:defRPr b="0" baseline="0" cap="none" i="0" spc="0" strike="noStrike" sz="1800" u="none" kumimoji="0" normalizeH="0">
+          <a:defRPr kumimoji="0" sz="1800" b="0" i="0" u="none" strike="noStrike" cap="none" spc="0" normalizeH="0" baseline="0">
             <a:ln>
               <a:noFill/>
             </a:ln>
@@ -5159,7 +5284,7 @@
           <a:buFontTx/>
           <a:buNone/>
           <a:tabLst/>
-          <a:defRPr b="0" baseline="0" cap="none" i="0" spc="0" strike="noStrike" sz="1800" u="none" kumimoji="0" normalizeH="0">
+          <a:defRPr kumimoji="0" sz="1800" b="0" i="0" u="none" strike="noStrike" cap="none" spc="0" normalizeH="0" baseline="0">
             <a:ln>
               <a:noFill/>
             </a:ln>
@@ -5185,7 +5310,7 @@
           <a:buFontTx/>
           <a:buNone/>
           <a:tabLst/>
-          <a:defRPr b="0" baseline="0" cap="none" i="0" spc="0" strike="noStrike" sz="1800" u="none" kumimoji="0" normalizeH="0">
+          <a:defRPr kumimoji="0" sz="1800" b="0" i="0" u="none" strike="noStrike" cap="none" spc="0" normalizeH="0" baseline="0">
             <a:ln>
               <a:noFill/>
             </a:ln>
@@ -5198,18 +5323,25 @@
         </a:lvl9pPr>
       </a:lstStyle>
       <a:style>
-        <a:lnRef idx="0"/>
-        <a:fillRef idx="0"/>
-        <a:effectRef idx="0"/>
+        <a:lnRef idx="0">
+          <a:scrgbClr r="0" g="0" b="0"/>
+        </a:lnRef>
+        <a:fillRef idx="0">
+          <a:scrgbClr r="0" g="0" b="0"/>
+        </a:fillRef>
+        <a:effectRef idx="0">
+          <a:scrgbClr r="0" g="0" b="0"/>
+        </a:effectRef>
         <a:fontRef idx="none"/>
       </a:style>
     </a:txDef>
   </a:objectDefaults>
+  <a:extraClrSchemeLst/>
 </a:theme>
 </file>
 
 <file path=ppt/theme/theme2.xml><?xml version="1.0" encoding="utf-8"?>
-<a:theme xmlns:a="http://schemas.openxmlformats.org/drawingml/2006/main" xmlns:r="http://schemas.openxmlformats.org/officeDocument/2006/relationships" name="Office Theme">
+<a:theme xmlns:a="http://schemas.openxmlformats.org/drawingml/2006/main" name="Office Theme">
   <a:themeElements>
     <a:clrScheme name="Office Theme">
       <a:dk1>
@@ -5335,7 +5467,7 @@
       <a:effectStyleLst>
         <a:effectStyle>
           <a:effectLst>
-            <a:outerShdw sx="100000" sy="100000" kx="0" ky="0" algn="b" rotWithShape="0" blurRad="38100" dist="23000" dir="5400000">
+            <a:outerShdw blurRad="38100" dist="23000" dir="5400000" rotWithShape="0">
               <a:srgbClr val="000000">
                 <a:alpha val="35000"/>
               </a:srgbClr>
@@ -5344,7 +5476,7 @@
         </a:effectStyle>
         <a:effectStyle>
           <a:effectLst>
-            <a:outerShdw sx="100000" sy="100000" kx="0" ky="0" algn="b" rotWithShape="0" blurRad="38100" dist="23000" dir="5400000">
+            <a:outerShdw blurRad="38100" dist="23000" dir="5400000" rotWithShape="0">
               <a:srgbClr val="000000">
                 <a:alpha val="35000"/>
               </a:srgbClr>
@@ -5353,7 +5485,7 @@
         </a:effectStyle>
         <a:effectStyle>
           <a:effectLst>
-            <a:outerShdw sx="100000" sy="100000" kx="0" ky="0" algn="b" rotWithShape="0" blurRad="38100" dist="20000" dir="5400000">
+            <a:outerShdw blurRad="38100" dist="20000" dir="5400000" rotWithShape="0">
               <a:srgbClr val="000000">
                 <a:alpha val="38000"/>
               </a:srgbClr>
@@ -5427,7 +5559,7 @@
           <a:round/>
         </a:ln>
         <a:effectLst>
-          <a:outerShdw sx="100000" sy="100000" kx="0" ky="0" algn="b" rotWithShape="0" blurRad="38100" dist="23000" dir="5400000">
+          <a:outerShdw blurRad="38100" dist="23000" dir="5400000" rotWithShape="0">
             <a:srgbClr val="000000">
               <a:alpha val="35000"/>
             </a:srgbClr>
@@ -5435,7 +5567,7 @@
         </a:effectLst>
         <a:sp3d/>
       </a:spPr>
-      <a:bodyPr rot="0" spcFirstLastPara="1" vertOverflow="overflow" horzOverflow="overflow" vert="horz" wrap="square" lIns="45719" tIns="45719" rIns="45719" bIns="45719" numCol="1" spcCol="38100" rtlCol="0" anchor="ctr" upright="0">
+      <a:bodyPr rot="0" spcFirstLastPara="1" vertOverflow="overflow" horzOverflow="overflow" vert="horz" wrap="square" lIns="45719" tIns="45719" rIns="45719" bIns="45719" numCol="1" spcCol="38100" rtlCol="0" anchor="ctr">
         <a:spAutoFit/>
       </a:bodyPr>
       <a:lstStyle>
@@ -5454,7 +5586,7 @@
           <a:buFontTx/>
           <a:buNone/>
           <a:tabLst/>
-          <a:defRPr b="0" baseline="0" cap="none" i="0" spc="0" strike="noStrike" sz="1800" u="none" kumimoji="0" normalizeH="0">
+          <a:defRPr kumimoji="0" sz="1800" b="0" i="0" u="none" strike="noStrike" cap="none" spc="0" normalizeH="0" baseline="0">
             <a:ln>
               <a:noFill/>
             </a:ln>
@@ -5484,7 +5616,7 @@
           <a:buFontTx/>
           <a:buNone/>
           <a:tabLst/>
-          <a:defRPr b="0" baseline="0" cap="none" i="0" spc="0" strike="noStrike" sz="1800" u="none" kumimoji="0" normalizeH="0">
+          <a:defRPr kumimoji="0" sz="1800" b="0" i="0" u="none" strike="noStrike" cap="none" spc="0" normalizeH="0" baseline="0">
             <a:ln>
               <a:noFill/>
             </a:ln>
@@ -5510,7 +5642,7 @@
           <a:buFontTx/>
           <a:buNone/>
           <a:tabLst/>
-          <a:defRPr b="0" baseline="0" cap="none" i="0" spc="0" strike="noStrike" sz="1800" u="none" kumimoji="0" normalizeH="0">
+          <a:defRPr kumimoji="0" sz="1800" b="0" i="0" u="none" strike="noStrike" cap="none" spc="0" normalizeH="0" baseline="0">
             <a:ln>
               <a:noFill/>
             </a:ln>
@@ -5536,7 +5668,7 @@
           <a:buFontTx/>
           <a:buNone/>
           <a:tabLst/>
-          <a:defRPr b="0" baseline="0" cap="none" i="0" spc="0" strike="noStrike" sz="1800" u="none" kumimoji="0" normalizeH="0">
+          <a:defRPr kumimoji="0" sz="1800" b="0" i="0" u="none" strike="noStrike" cap="none" spc="0" normalizeH="0" baseline="0">
             <a:ln>
               <a:noFill/>
             </a:ln>
@@ -5562,7 +5694,7 @@
           <a:buFontTx/>
           <a:buNone/>
           <a:tabLst/>
-          <a:defRPr b="0" baseline="0" cap="none" i="0" spc="0" strike="noStrike" sz="1800" u="none" kumimoji="0" normalizeH="0">
+          <a:defRPr kumimoji="0" sz="1800" b="0" i="0" u="none" strike="noStrike" cap="none" spc="0" normalizeH="0" baseline="0">
             <a:ln>
               <a:noFill/>
             </a:ln>
@@ -5588,7 +5720,7 @@
           <a:buFontTx/>
           <a:buNone/>
           <a:tabLst/>
-          <a:defRPr b="0" baseline="0" cap="none" i="0" spc="0" strike="noStrike" sz="1800" u="none" kumimoji="0" normalizeH="0">
+          <a:defRPr kumimoji="0" sz="1800" b="0" i="0" u="none" strike="noStrike" cap="none" spc="0" normalizeH="0" baseline="0">
             <a:ln>
               <a:noFill/>
             </a:ln>
@@ -5614,7 +5746,7 @@
           <a:buFontTx/>
           <a:buNone/>
           <a:tabLst/>
-          <a:defRPr b="0" baseline="0" cap="none" i="0" spc="0" strike="noStrike" sz="1800" u="none" kumimoji="0" normalizeH="0">
+          <a:defRPr kumimoji="0" sz="1800" b="0" i="0" u="none" strike="noStrike" cap="none" spc="0" normalizeH="0" baseline="0">
             <a:ln>
               <a:noFill/>
             </a:ln>
@@ -5640,7 +5772,7 @@
           <a:buFontTx/>
           <a:buNone/>
           <a:tabLst/>
-          <a:defRPr b="0" baseline="0" cap="none" i="0" spc="0" strike="noStrike" sz="1800" u="none" kumimoji="0" normalizeH="0">
+          <a:defRPr kumimoji="0" sz="1800" b="0" i="0" u="none" strike="noStrike" cap="none" spc="0" normalizeH="0" baseline="0">
             <a:ln>
               <a:noFill/>
             </a:ln>
@@ -5666,7 +5798,7 @@
           <a:buFontTx/>
           <a:buNone/>
           <a:tabLst/>
-          <a:defRPr b="0" baseline="0" cap="none" i="0" spc="0" strike="noStrike" sz="1800" u="none" kumimoji="0" normalizeH="0">
+          <a:defRPr kumimoji="0" sz="1800" b="0" i="0" u="none" strike="noStrike" cap="none" spc="0" normalizeH="0" baseline="0">
             <a:ln>
               <a:noFill/>
             </a:ln>
@@ -5692,7 +5824,7 @@
           <a:buFontTx/>
           <a:buNone/>
           <a:tabLst/>
-          <a:defRPr b="0" baseline="0" cap="none" i="0" spc="0" strike="noStrike" sz="1800" u="none" kumimoji="0" normalizeH="0">
+          <a:defRPr kumimoji="0" sz="1800" b="0" i="0" u="none" strike="noStrike" cap="none" spc="0" normalizeH="0" baseline="0">
             <a:ln>
               <a:noFill/>
             </a:ln>
@@ -5705,9 +5837,15 @@
         </a:lvl9pPr>
       </a:lstStyle>
       <a:style>
-        <a:lnRef idx="0"/>
-        <a:fillRef idx="0"/>
-        <a:effectRef idx="0"/>
+        <a:lnRef idx="0">
+          <a:scrgbClr r="0" g="0" b="0"/>
+        </a:lnRef>
+        <a:fillRef idx="0">
+          <a:scrgbClr r="0" g="0" b="0"/>
+        </a:fillRef>
+        <a:effectRef idx="0">
+          <a:scrgbClr r="0" g="0" b="0"/>
+        </a:effectRef>
         <a:fontRef idx="none"/>
       </a:style>
     </a:spDef>
@@ -5722,7 +5860,7 @@
           <a:round/>
         </a:ln>
         <a:effectLst>
-          <a:outerShdw sx="100000" sy="100000" kx="0" ky="0" algn="b" rotWithShape="0" blurRad="38100" dist="20000" dir="5400000">
+          <a:outerShdw blurRad="38100" dist="20000" dir="5400000" rotWithShape="0">
             <a:srgbClr val="000000">
               <a:alpha val="38000"/>
             </a:srgbClr>
@@ -5730,7 +5868,7 @@
         </a:effectLst>
         <a:sp3d/>
       </a:spPr>
-      <a:bodyPr rot="0" spcFirstLastPara="1" vertOverflow="overflow" horzOverflow="overflow" vert="horz" wrap="square" lIns="91439" tIns="45719" rIns="91439" bIns="45719" numCol="1" spcCol="38100" rtlCol="0" anchor="t" upright="0">
+      <a:bodyPr rot="0" spcFirstLastPara="1" vertOverflow="overflow" horzOverflow="overflow" vert="horz" wrap="square" lIns="91439" tIns="45719" rIns="91439" bIns="45719" numCol="1" spcCol="38100" rtlCol="0" anchor="t">
         <a:noAutofit/>
       </a:bodyPr>
       <a:lstStyle>
@@ -5749,7 +5887,7 @@
           <a:buFontTx/>
           <a:buNone/>
           <a:tabLst/>
-          <a:defRPr b="0" baseline="0" cap="none" i="0" spc="0" strike="noStrike" sz="1800" u="none" kumimoji="0" normalizeH="0">
+          <a:defRPr kumimoji="0" sz="1800" b="0" i="0" u="none" strike="noStrike" cap="none" spc="0" normalizeH="0" baseline="0">
             <a:ln>
               <a:noFill/>
             </a:ln>
@@ -5775,7 +5913,7 @@
           <a:buFontTx/>
           <a:buNone/>
           <a:tabLst/>
-          <a:defRPr b="0" baseline="0" cap="none" i="0" spc="0" strike="noStrike" sz="1800" u="none" kumimoji="0" normalizeH="0">
+          <a:defRPr kumimoji="0" sz="1800" b="0" i="0" u="none" strike="noStrike" cap="none" spc="0" normalizeH="0" baseline="0">
             <a:ln>
               <a:noFill/>
             </a:ln>
@@ -5801,7 +5939,7 @@
           <a:buFontTx/>
           <a:buNone/>
           <a:tabLst/>
-          <a:defRPr b="0" baseline="0" cap="none" i="0" spc="0" strike="noStrike" sz="1800" u="none" kumimoji="0" normalizeH="0">
+          <a:defRPr kumimoji="0" sz="1800" b="0" i="0" u="none" strike="noStrike" cap="none" spc="0" normalizeH="0" baseline="0">
             <a:ln>
               <a:noFill/>
             </a:ln>
@@ -5827,7 +5965,7 @@
           <a:buFontTx/>
           <a:buNone/>
           <a:tabLst/>
-          <a:defRPr b="0" baseline="0" cap="none" i="0" spc="0" strike="noStrike" sz="1800" u="none" kumimoji="0" normalizeH="0">
+          <a:defRPr kumimoji="0" sz="1800" b="0" i="0" u="none" strike="noStrike" cap="none" spc="0" normalizeH="0" baseline="0">
             <a:ln>
               <a:noFill/>
             </a:ln>
@@ -5853,7 +5991,7 @@
           <a:buFontTx/>
           <a:buNone/>
           <a:tabLst/>
-          <a:defRPr b="0" baseline="0" cap="none" i="0" spc="0" strike="noStrike" sz="1800" u="none" kumimoji="0" normalizeH="0">
+          <a:defRPr kumimoji="0" sz="1800" b="0" i="0" u="none" strike="noStrike" cap="none" spc="0" normalizeH="0" baseline="0">
             <a:ln>
               <a:noFill/>
             </a:ln>
@@ -5879,7 +6017,7 @@
           <a:buFontTx/>
           <a:buNone/>
           <a:tabLst/>
-          <a:defRPr b="0" baseline="0" cap="none" i="0" spc="0" strike="noStrike" sz="1800" u="none" kumimoji="0" normalizeH="0">
+          <a:defRPr kumimoji="0" sz="1800" b="0" i="0" u="none" strike="noStrike" cap="none" spc="0" normalizeH="0" baseline="0">
             <a:ln>
               <a:noFill/>
             </a:ln>
@@ -5905,7 +6043,7 @@
           <a:buFontTx/>
           <a:buNone/>
           <a:tabLst/>
-          <a:defRPr b="0" baseline="0" cap="none" i="0" spc="0" strike="noStrike" sz="1800" u="none" kumimoji="0" normalizeH="0">
+          <a:defRPr kumimoji="0" sz="1800" b="0" i="0" u="none" strike="noStrike" cap="none" spc="0" normalizeH="0" baseline="0">
             <a:ln>
               <a:noFill/>
             </a:ln>
@@ -5931,7 +6069,7 @@
           <a:buFontTx/>
           <a:buNone/>
           <a:tabLst/>
-          <a:defRPr b="0" baseline="0" cap="none" i="0" spc="0" strike="noStrike" sz="1800" u="none" kumimoji="0" normalizeH="0">
+          <a:defRPr kumimoji="0" sz="1800" b="0" i="0" u="none" strike="noStrike" cap="none" spc="0" normalizeH="0" baseline="0">
             <a:ln>
               <a:noFill/>
             </a:ln>
@@ -5957,7 +6095,7 @@
           <a:buFontTx/>
           <a:buNone/>
           <a:tabLst/>
-          <a:defRPr b="0" baseline="0" cap="none" i="0" spc="0" strike="noStrike" sz="1800" u="none" kumimoji="0" normalizeH="0">
+          <a:defRPr kumimoji="0" sz="1800" b="0" i="0" u="none" strike="noStrike" cap="none" spc="0" normalizeH="0" baseline="0">
             <a:ln>
               <a:noFill/>
             </a:ln>
@@ -5983,7 +6121,7 @@
           <a:buFontTx/>
           <a:buNone/>
           <a:tabLst/>
-          <a:defRPr b="0" baseline="0" cap="none" i="0" spc="0" strike="noStrike" sz="1800" u="none" kumimoji="0" normalizeH="0">
+          <a:defRPr kumimoji="0" sz="1800" b="0" i="0" u="none" strike="noStrike" cap="none" spc="0" normalizeH="0" baseline="0">
             <a:ln>
               <a:noFill/>
             </a:ln>
@@ -5996,9 +6134,15 @@
         </a:lvl9pPr>
       </a:lstStyle>
       <a:style>
-        <a:lnRef idx="0"/>
-        <a:fillRef idx="0"/>
-        <a:effectRef idx="0"/>
+        <a:lnRef idx="0">
+          <a:scrgbClr r="0" g="0" b="0"/>
+        </a:lnRef>
+        <a:fillRef idx="0">
+          <a:scrgbClr r="0" g="0" b="0"/>
+        </a:fillRef>
+        <a:effectRef idx="0">
+          <a:scrgbClr r="0" g="0" b="0"/>
+        </a:effectRef>
         <a:fontRef idx="none"/>
       </a:style>
     </a:lnDef>
@@ -6012,7 +6156,7 @@
         <a:effectLst/>
         <a:sp3d/>
       </a:spPr>
-      <a:bodyPr rot="0" spcFirstLastPara="1" vertOverflow="overflow" horzOverflow="overflow" vert="horz" wrap="square" lIns="45719" tIns="45719" rIns="45719" bIns="45719" numCol="1" spcCol="38100" rtlCol="0" anchor="t" upright="0">
+      <a:bodyPr rot="0" spcFirstLastPara="1" vertOverflow="overflow" horzOverflow="overflow" vert="horz" wrap="square" lIns="45719" tIns="45719" rIns="45719" bIns="45719" numCol="1" spcCol="38100" rtlCol="0" anchor="t">
         <a:spAutoFit/>
       </a:bodyPr>
       <a:lstStyle>
@@ -6031,7 +6175,7 @@
           <a:buFontTx/>
           <a:buNone/>
           <a:tabLst/>
-          <a:defRPr b="0" baseline="0" cap="none" i="0" spc="0" strike="noStrike" sz="1800" u="none" kumimoji="0" normalizeH="0">
+          <a:defRPr kumimoji="0" sz="1800" b="0" i="0" u="none" strike="noStrike" cap="none" spc="0" normalizeH="0" baseline="0">
             <a:ln>
               <a:noFill/>
             </a:ln>
@@ -6061,7 +6205,7 @@
           <a:buFontTx/>
           <a:buNone/>
           <a:tabLst/>
-          <a:defRPr b="0" baseline="0" cap="none" i="0" spc="0" strike="noStrike" sz="1800" u="none" kumimoji="0" normalizeH="0">
+          <a:defRPr kumimoji="0" sz="1800" b="0" i="0" u="none" strike="noStrike" cap="none" spc="0" normalizeH="0" baseline="0">
             <a:ln>
               <a:noFill/>
             </a:ln>
@@ -6087,7 +6231,7 @@
           <a:buFontTx/>
           <a:buNone/>
           <a:tabLst/>
-          <a:defRPr b="0" baseline="0" cap="none" i="0" spc="0" strike="noStrike" sz="1800" u="none" kumimoji="0" normalizeH="0">
+          <a:defRPr kumimoji="0" sz="1800" b="0" i="0" u="none" strike="noStrike" cap="none" spc="0" normalizeH="0" baseline="0">
             <a:ln>
               <a:noFill/>
             </a:ln>
@@ -6113,7 +6257,7 @@
           <a:buFontTx/>
           <a:buNone/>
           <a:tabLst/>
-          <a:defRPr b="0" baseline="0" cap="none" i="0" spc="0" strike="noStrike" sz="1800" u="none" kumimoji="0" normalizeH="0">
+          <a:defRPr kumimoji="0" sz="1800" b="0" i="0" u="none" strike="noStrike" cap="none" spc="0" normalizeH="0" baseline="0">
             <a:ln>
               <a:noFill/>
             </a:ln>
@@ -6139,7 +6283,7 @@
           <a:buFontTx/>
           <a:buNone/>
           <a:tabLst/>
-          <a:defRPr b="0" baseline="0" cap="none" i="0" spc="0" strike="noStrike" sz="1800" u="none" kumimoji="0" normalizeH="0">
+          <a:defRPr kumimoji="0" sz="1800" b="0" i="0" u="none" strike="noStrike" cap="none" spc="0" normalizeH="0" baseline="0">
             <a:ln>
               <a:noFill/>
             </a:ln>
@@ -6165,7 +6309,7 @@
           <a:buFontTx/>
           <a:buNone/>
           <a:tabLst/>
-          <a:defRPr b="0" baseline="0" cap="none" i="0" spc="0" strike="noStrike" sz="1800" u="none" kumimoji="0" normalizeH="0">
+          <a:defRPr kumimoji="0" sz="1800" b="0" i="0" u="none" strike="noStrike" cap="none" spc="0" normalizeH="0" baseline="0">
             <a:ln>
               <a:noFill/>
             </a:ln>
@@ -6191,7 +6335,7 @@
           <a:buFontTx/>
           <a:buNone/>
           <a:tabLst/>
-          <a:defRPr b="0" baseline="0" cap="none" i="0" spc="0" strike="noStrike" sz="1800" u="none" kumimoji="0" normalizeH="0">
+          <a:defRPr kumimoji="0" sz="1800" b="0" i="0" u="none" strike="noStrike" cap="none" spc="0" normalizeH="0" baseline="0">
             <a:ln>
               <a:noFill/>
             </a:ln>
@@ -6217,7 +6361,7 @@
           <a:buFontTx/>
           <a:buNone/>
           <a:tabLst/>
-          <a:defRPr b="0" baseline="0" cap="none" i="0" spc="0" strike="noStrike" sz="1800" u="none" kumimoji="0" normalizeH="0">
+          <a:defRPr kumimoji="0" sz="1800" b="0" i="0" u="none" strike="noStrike" cap="none" spc="0" normalizeH="0" baseline="0">
             <a:ln>
               <a:noFill/>
             </a:ln>
@@ -6243,7 +6387,7 @@
           <a:buFontTx/>
           <a:buNone/>
           <a:tabLst/>
-          <a:defRPr b="0" baseline="0" cap="none" i="0" spc="0" strike="noStrike" sz="1800" u="none" kumimoji="0" normalizeH="0">
+          <a:defRPr kumimoji="0" sz="1800" b="0" i="0" u="none" strike="noStrike" cap="none" spc="0" normalizeH="0" baseline="0">
             <a:ln>
               <a:noFill/>
             </a:ln>
@@ -6269,7 +6413,7 @@
           <a:buFontTx/>
           <a:buNone/>
           <a:tabLst/>
-          <a:defRPr b="0" baseline="0" cap="none" i="0" spc="0" strike="noStrike" sz="1800" u="none" kumimoji="0" normalizeH="0">
+          <a:defRPr kumimoji="0" sz="1800" b="0" i="0" u="none" strike="noStrike" cap="none" spc="0" normalizeH="0" baseline="0">
             <a:ln>
               <a:noFill/>
             </a:ln>
@@ -6282,12 +6426,19 @@
         </a:lvl9pPr>
       </a:lstStyle>
       <a:style>
-        <a:lnRef idx="0"/>
-        <a:fillRef idx="0"/>
-        <a:effectRef idx="0"/>
+        <a:lnRef idx="0">
+          <a:scrgbClr r="0" g="0" b="0"/>
+        </a:lnRef>
+        <a:fillRef idx="0">
+          <a:scrgbClr r="0" g="0" b="0"/>
+        </a:fillRef>
+        <a:effectRef idx="0">
+          <a:scrgbClr r="0" g="0" b="0"/>
+        </a:effectRef>
         <a:fontRef idx="none"/>
       </a:style>
     </a:txDef>
   </a:objectDefaults>
+  <a:extraClrSchemeLst/>
 </a:theme>
 </file>
</xml_diff>